<commit_message>
GitLearning - rebase - git head - detached head state
</commit_message>
<xml_diff>
--- a/GitLearning.pptx
+++ b/GitLearning.pptx
@@ -4,6 +4,9 @@
   <p:sldMasterIdLst>
     <p:sldMasterId id="2147483648" r:id="rId1"/>
   </p:sldMasterIdLst>
+  <p:notesMasterIdLst>
+    <p:notesMasterId r:id="rId16"/>
+  </p:notesMasterIdLst>
   <p:sldIdLst>
     <p:sldId id="256" r:id="rId2"/>
     <p:sldId id="257" r:id="rId3"/>
@@ -17,6 +20,8 @@
     <p:sldId id="264" r:id="rId11"/>
     <p:sldId id="266" r:id="rId12"/>
     <p:sldId id="267" r:id="rId13"/>
+    <p:sldId id="268" r:id="rId14"/>
+    <p:sldId id="269" r:id="rId15"/>
   </p:sldIdLst>
   <p:sldSz cx="12192000" cy="6858000"/>
   <p:notesSz cx="6858000" cy="9144000"/>
@@ -116,6 +121,355 @@
     </a:lvl9pPr>
   </p:defaultTextStyle>
 </p:presentation>
+</file>
+
+<file path=ppt/notesMasters/notesMaster1.xml><?xml version="1.0" encoding="utf-8"?>
+<p:notesMaster xmlns:a="http://schemas.openxmlformats.org/drawingml/2006/main" xmlns:r="http://schemas.openxmlformats.org/officeDocument/2006/relationships" xmlns:p="http://schemas.openxmlformats.org/presentationml/2006/main">
+  <p:cSld>
+    <p:bg>
+      <p:bgRef idx="1001">
+        <a:schemeClr val="bg1"/>
+      </p:bgRef>
+    </p:bg>
+    <p:spTree>
+      <p:nvGrpSpPr>
+        <p:cNvPr id="1" name=""/>
+        <p:cNvGrpSpPr/>
+        <p:nvPr/>
+      </p:nvGrpSpPr>
+      <p:grpSpPr>
+        <a:xfrm>
+          <a:off x="0" y="0"/>
+          <a:ext cx="0" cy="0"/>
+          <a:chOff x="0" y="0"/>
+          <a:chExt cx="0" cy="0"/>
+        </a:xfrm>
+      </p:grpSpPr>
+      <p:sp>
+        <p:nvSpPr>
+          <p:cNvPr id="2" name="Header Placeholder 1"/>
+          <p:cNvSpPr>
+            <a:spLocks noGrp="1"/>
+          </p:cNvSpPr>
+          <p:nvPr>
+            <p:ph type="hdr" sz="quarter"/>
+          </p:nvPr>
+        </p:nvSpPr>
+        <p:spPr>
+          <a:xfrm>
+            <a:off x="0" y="0"/>
+            <a:ext cx="2971800" cy="458788"/>
+          </a:xfrm>
+          <a:prstGeom prst="rect">
+            <a:avLst/>
+          </a:prstGeom>
+        </p:spPr>
+        <p:txBody>
+          <a:bodyPr vert="horz" lIns="91440" tIns="45720" rIns="91440" bIns="45720" rtlCol="0"/>
+          <a:lstStyle>
+            <a:lvl1pPr algn="l">
+              <a:defRPr sz="1200"/>
+            </a:lvl1pPr>
+          </a:lstStyle>
+          <a:p>
+            <a:endParaRPr lang="en-US"/>
+          </a:p>
+        </p:txBody>
+      </p:sp>
+      <p:sp>
+        <p:nvSpPr>
+          <p:cNvPr id="3" name="Date Placeholder 2"/>
+          <p:cNvSpPr>
+            <a:spLocks noGrp="1"/>
+          </p:cNvSpPr>
+          <p:nvPr>
+            <p:ph type="dt" idx="1"/>
+          </p:nvPr>
+        </p:nvSpPr>
+        <p:spPr>
+          <a:xfrm>
+            <a:off x="3884613" y="0"/>
+            <a:ext cx="2971800" cy="458788"/>
+          </a:xfrm>
+          <a:prstGeom prst="rect">
+            <a:avLst/>
+          </a:prstGeom>
+        </p:spPr>
+        <p:txBody>
+          <a:bodyPr vert="horz" lIns="91440" tIns="45720" rIns="91440" bIns="45720" rtlCol="0"/>
+          <a:lstStyle>
+            <a:lvl1pPr algn="r">
+              <a:defRPr sz="1200"/>
+            </a:lvl1pPr>
+          </a:lstStyle>
+          <a:p>
+            <a:fld id="{14CB6E3A-A1EA-47CB-800A-5C008036CFC1}" type="datetimeFigureOut">
+              <a:rPr lang="en-US" smtClean="0"/>
+              <a:t>9/15/2024</a:t>
+            </a:fld>
+            <a:endParaRPr lang="en-US"/>
+          </a:p>
+        </p:txBody>
+      </p:sp>
+      <p:sp>
+        <p:nvSpPr>
+          <p:cNvPr id="4" name="Slide Image Placeholder 3"/>
+          <p:cNvSpPr>
+            <a:spLocks noGrp="1" noRot="1" noChangeAspect="1"/>
+          </p:cNvSpPr>
+          <p:nvPr>
+            <p:ph type="sldImg" idx="2"/>
+          </p:nvPr>
+        </p:nvSpPr>
+        <p:spPr>
+          <a:xfrm>
+            <a:off x="685800" y="1143000"/>
+            <a:ext cx="5486400" cy="3086100"/>
+          </a:xfrm>
+          <a:prstGeom prst="rect">
+            <a:avLst/>
+          </a:prstGeom>
+          <a:noFill/>
+          <a:ln w="12700">
+            <a:solidFill>
+              <a:prstClr val="black"/>
+            </a:solidFill>
+          </a:ln>
+        </p:spPr>
+        <p:txBody>
+          <a:bodyPr vert="horz" lIns="91440" tIns="45720" rIns="91440" bIns="45720" rtlCol="0" anchor="ctr"/>
+          <a:lstStyle/>
+          <a:p>
+            <a:endParaRPr lang="en-US"/>
+          </a:p>
+        </p:txBody>
+      </p:sp>
+      <p:sp>
+        <p:nvSpPr>
+          <p:cNvPr id="5" name="Notes Placeholder 4"/>
+          <p:cNvSpPr>
+            <a:spLocks noGrp="1"/>
+          </p:cNvSpPr>
+          <p:nvPr>
+            <p:ph type="body" sz="quarter" idx="3"/>
+          </p:nvPr>
+        </p:nvSpPr>
+        <p:spPr>
+          <a:xfrm>
+            <a:off x="685800" y="4400550"/>
+            <a:ext cx="5486400" cy="3600450"/>
+          </a:xfrm>
+          <a:prstGeom prst="rect">
+            <a:avLst/>
+          </a:prstGeom>
+        </p:spPr>
+        <p:txBody>
+          <a:bodyPr vert="horz" lIns="91440" tIns="45720" rIns="91440" bIns="45720" rtlCol="0"/>
+          <a:lstStyle/>
+          <a:p>
+            <a:pPr lvl="0"/>
+            <a:r>
+              <a:rPr lang="en-US"/>
+              <a:t>Click to edit Master text styles</a:t>
+            </a:r>
+          </a:p>
+          <a:p>
+            <a:pPr lvl="1"/>
+            <a:r>
+              <a:rPr lang="en-US"/>
+              <a:t>Second level</a:t>
+            </a:r>
+          </a:p>
+          <a:p>
+            <a:pPr lvl="2"/>
+            <a:r>
+              <a:rPr lang="en-US"/>
+              <a:t>Third level</a:t>
+            </a:r>
+          </a:p>
+          <a:p>
+            <a:pPr lvl="3"/>
+            <a:r>
+              <a:rPr lang="en-US"/>
+              <a:t>Fourth level</a:t>
+            </a:r>
+          </a:p>
+          <a:p>
+            <a:pPr lvl="4"/>
+            <a:r>
+              <a:rPr lang="en-US"/>
+              <a:t>Fifth level</a:t>
+            </a:r>
+          </a:p>
+        </p:txBody>
+      </p:sp>
+      <p:sp>
+        <p:nvSpPr>
+          <p:cNvPr id="6" name="Footer Placeholder 5"/>
+          <p:cNvSpPr>
+            <a:spLocks noGrp="1"/>
+          </p:cNvSpPr>
+          <p:nvPr>
+            <p:ph type="ftr" sz="quarter" idx="4"/>
+          </p:nvPr>
+        </p:nvSpPr>
+        <p:spPr>
+          <a:xfrm>
+            <a:off x="0" y="8685213"/>
+            <a:ext cx="2971800" cy="458787"/>
+          </a:xfrm>
+          <a:prstGeom prst="rect">
+            <a:avLst/>
+          </a:prstGeom>
+        </p:spPr>
+        <p:txBody>
+          <a:bodyPr vert="horz" lIns="91440" tIns="45720" rIns="91440" bIns="45720" rtlCol="0" anchor="b"/>
+          <a:lstStyle>
+            <a:lvl1pPr algn="l">
+              <a:defRPr sz="1200"/>
+            </a:lvl1pPr>
+          </a:lstStyle>
+          <a:p>
+            <a:endParaRPr lang="en-US"/>
+          </a:p>
+        </p:txBody>
+      </p:sp>
+      <p:sp>
+        <p:nvSpPr>
+          <p:cNvPr id="7" name="Slide Number Placeholder 6"/>
+          <p:cNvSpPr>
+            <a:spLocks noGrp="1"/>
+          </p:cNvSpPr>
+          <p:nvPr>
+            <p:ph type="sldNum" sz="quarter" idx="5"/>
+          </p:nvPr>
+        </p:nvSpPr>
+        <p:spPr>
+          <a:xfrm>
+            <a:off x="3884613" y="8685213"/>
+            <a:ext cx="2971800" cy="458787"/>
+          </a:xfrm>
+          <a:prstGeom prst="rect">
+            <a:avLst/>
+          </a:prstGeom>
+        </p:spPr>
+        <p:txBody>
+          <a:bodyPr vert="horz" lIns="91440" tIns="45720" rIns="91440" bIns="45720" rtlCol="0" anchor="b"/>
+          <a:lstStyle>
+            <a:lvl1pPr algn="r">
+              <a:defRPr sz="1200"/>
+            </a:lvl1pPr>
+          </a:lstStyle>
+          <a:p>
+            <a:fld id="{7B3A35F7-8A82-46DD-8680-DDF51826B530}" type="slidenum">
+              <a:rPr lang="en-US" smtClean="0"/>
+              <a:t>‹#›</a:t>
+            </a:fld>
+            <a:endParaRPr lang="en-US"/>
+          </a:p>
+        </p:txBody>
+      </p:sp>
+    </p:spTree>
+    <p:extLst>
+      <p:ext uri="{BB962C8B-B14F-4D97-AF65-F5344CB8AC3E}">
+        <p14:creationId xmlns:p14="http://schemas.microsoft.com/office/powerpoint/2010/main" val="2229634092"/>
+      </p:ext>
+    </p:extLst>
+  </p:cSld>
+  <p:clrMap bg1="lt1" tx1="dk1" bg2="lt2" tx2="dk2" accent1="accent1" accent2="accent2" accent3="accent3" accent4="accent4" accent5="accent5" accent6="accent6" hlink="hlink" folHlink="folHlink"/>
+  <p:notesStyle>
+    <a:lvl1pPr marL="0" algn="l" defTabSz="914400" rtl="0" eaLnBrk="1" latinLnBrk="0" hangingPunct="1">
+      <a:defRPr sz="1200" kern="1200">
+        <a:solidFill>
+          <a:schemeClr val="tx1"/>
+        </a:solidFill>
+        <a:latin typeface="+mn-lt"/>
+        <a:ea typeface="+mn-ea"/>
+        <a:cs typeface="+mn-cs"/>
+      </a:defRPr>
+    </a:lvl1pPr>
+    <a:lvl2pPr marL="457200" algn="l" defTabSz="914400" rtl="0" eaLnBrk="1" latinLnBrk="0" hangingPunct="1">
+      <a:defRPr sz="1200" kern="1200">
+        <a:solidFill>
+          <a:schemeClr val="tx1"/>
+        </a:solidFill>
+        <a:latin typeface="+mn-lt"/>
+        <a:ea typeface="+mn-ea"/>
+        <a:cs typeface="+mn-cs"/>
+      </a:defRPr>
+    </a:lvl2pPr>
+    <a:lvl3pPr marL="914400" algn="l" defTabSz="914400" rtl="0" eaLnBrk="1" latinLnBrk="0" hangingPunct="1">
+      <a:defRPr sz="1200" kern="1200">
+        <a:solidFill>
+          <a:schemeClr val="tx1"/>
+        </a:solidFill>
+        <a:latin typeface="+mn-lt"/>
+        <a:ea typeface="+mn-ea"/>
+        <a:cs typeface="+mn-cs"/>
+      </a:defRPr>
+    </a:lvl3pPr>
+    <a:lvl4pPr marL="1371600" algn="l" defTabSz="914400" rtl="0" eaLnBrk="1" latinLnBrk="0" hangingPunct="1">
+      <a:defRPr sz="1200" kern="1200">
+        <a:solidFill>
+          <a:schemeClr val="tx1"/>
+        </a:solidFill>
+        <a:latin typeface="+mn-lt"/>
+        <a:ea typeface="+mn-ea"/>
+        <a:cs typeface="+mn-cs"/>
+      </a:defRPr>
+    </a:lvl4pPr>
+    <a:lvl5pPr marL="1828800" algn="l" defTabSz="914400" rtl="0" eaLnBrk="1" latinLnBrk="0" hangingPunct="1">
+      <a:defRPr sz="1200" kern="1200">
+        <a:solidFill>
+          <a:schemeClr val="tx1"/>
+        </a:solidFill>
+        <a:latin typeface="+mn-lt"/>
+        <a:ea typeface="+mn-ea"/>
+        <a:cs typeface="+mn-cs"/>
+      </a:defRPr>
+    </a:lvl5pPr>
+    <a:lvl6pPr marL="2286000" algn="l" defTabSz="914400" rtl="0" eaLnBrk="1" latinLnBrk="0" hangingPunct="1">
+      <a:defRPr sz="1200" kern="1200">
+        <a:solidFill>
+          <a:schemeClr val="tx1"/>
+        </a:solidFill>
+        <a:latin typeface="+mn-lt"/>
+        <a:ea typeface="+mn-ea"/>
+        <a:cs typeface="+mn-cs"/>
+      </a:defRPr>
+    </a:lvl6pPr>
+    <a:lvl7pPr marL="2743200" algn="l" defTabSz="914400" rtl="0" eaLnBrk="1" latinLnBrk="0" hangingPunct="1">
+      <a:defRPr sz="1200" kern="1200">
+        <a:solidFill>
+          <a:schemeClr val="tx1"/>
+        </a:solidFill>
+        <a:latin typeface="+mn-lt"/>
+        <a:ea typeface="+mn-ea"/>
+        <a:cs typeface="+mn-cs"/>
+      </a:defRPr>
+    </a:lvl7pPr>
+    <a:lvl8pPr marL="3200400" algn="l" defTabSz="914400" rtl="0" eaLnBrk="1" latinLnBrk="0" hangingPunct="1">
+      <a:defRPr sz="1200" kern="1200">
+        <a:solidFill>
+          <a:schemeClr val="tx1"/>
+        </a:solidFill>
+        <a:latin typeface="+mn-lt"/>
+        <a:ea typeface="+mn-ea"/>
+        <a:cs typeface="+mn-cs"/>
+      </a:defRPr>
+    </a:lvl8pPr>
+    <a:lvl9pPr marL="3657600" algn="l" defTabSz="914400" rtl="0" eaLnBrk="1" latinLnBrk="0" hangingPunct="1">
+      <a:defRPr sz="1200" kern="1200">
+        <a:solidFill>
+          <a:schemeClr val="tx1"/>
+        </a:solidFill>
+        <a:latin typeface="+mn-lt"/>
+        <a:ea typeface="+mn-ea"/>
+        <a:cs typeface="+mn-cs"/>
+      </a:defRPr>
+    </a:lvl9pPr>
+  </p:notesStyle>
+</p:notesMaster>
 </file>
 
 <file path=ppt/slideLayouts/slideLayout1.xml><?xml version="1.0" encoding="utf-8"?>
@@ -3478,10 +3832,10 @@
             </a:pPr>
             <a:r>
               <a:rPr lang="en-US" dirty="0"/>
-              <a:t>&gt; Git rebase &lt;</a:t>
-            </a:r>
-            <a:r>
-              <a:rPr lang="en-US" i="1" dirty="0">
+              <a:t>&gt; Git rebase </a:t>
+            </a:r>
+            <a:r>
+              <a:rPr lang="en-US" dirty="0">
                 <a:solidFill>
                   <a:schemeClr val="tx1">
                     <a:lumMod val="50000"/>
@@ -3489,10 +3843,28 @@
                   </a:schemeClr>
                 </a:solidFill>
               </a:rPr>
+              <a:t>&lt;</a:t>
+            </a:r>
+            <a:r>
+              <a:rPr lang="en-US" i="1" dirty="0">
+                <a:solidFill>
+                  <a:schemeClr val="tx1">
+                    <a:lumMod val="50000"/>
+                    <a:lumOff val="50000"/>
+                  </a:schemeClr>
+                </a:solidFill>
+              </a:rPr>
               <a:t>branch-name</a:t>
             </a:r>
             <a:r>
-              <a:rPr lang="en-US" dirty="0"/>
+              <a:rPr lang="en-US" dirty="0">
+                <a:solidFill>
+                  <a:schemeClr val="tx1">
+                    <a:lumMod val="50000"/>
+                    <a:lumOff val="50000"/>
+                  </a:schemeClr>
+                </a:solidFill>
+              </a:rPr>
               <a:t>&gt;</a:t>
             </a:r>
           </a:p>
@@ -3551,7 +3923,7 @@
           <a:p>
             <a:r>
               <a:rPr lang="en-US" dirty="0"/>
-              <a:t>HEAD</a:t>
+              <a:t>Git HEAD</a:t>
             </a:r>
           </a:p>
         </p:txBody>
@@ -3575,7 +3947,7 @@
         <p:spPr>
           <a:xfrm>
             <a:off x="838200" y="1825625"/>
-            <a:ext cx="7299960" cy="4351338"/>
+            <a:ext cx="10515600" cy="4351338"/>
           </a:xfrm>
         </p:spPr>
         <p:txBody>
@@ -3584,119 +3956,225 @@
           </a:bodyPr>
           <a:lstStyle/>
           <a:p>
-            <a:r>
-              <a:rPr lang="en-US" sz="2400" dirty="0"/>
-              <a:t>HEAD is the symbolic name for the currently checked out commit.</a:t>
-            </a:r>
-          </a:p>
-          <a:p>
-            <a:r>
-              <a:rPr lang="en-US" sz="2400" dirty="0"/>
-              <a:t>HEAD always points to the most recent commit which is reflected in the working tree. Most git commands which make changes to the working tree will start by changing HEAD.</a:t>
-            </a:r>
-          </a:p>
-          <a:p>
-            <a:r>
-              <a:rPr lang="en-US" sz="2400" dirty="0"/>
-              <a:t>Normally HEAD points to a branch name (like </a:t>
-            </a:r>
-            <a:r>
-              <a:rPr lang="en-US" sz="2400" dirty="0" err="1"/>
-              <a:t>bugFix</a:t>
-            </a:r>
-            <a:r>
-              <a:rPr lang="en-US" sz="2400" dirty="0"/>
-              <a:t>). When you commit, the status of </a:t>
-            </a:r>
-            <a:r>
-              <a:rPr lang="en-US" sz="2400" dirty="0" err="1"/>
-              <a:t>bugFix</a:t>
-            </a:r>
-            <a:r>
-              <a:rPr lang="en-US" sz="2400" dirty="0"/>
-              <a:t> is </a:t>
-            </a:r>
-            <a:r>
-              <a:rPr lang="en-US" sz="2400" u="sng" dirty="0"/>
-              <a:t>altered</a:t>
-            </a:r>
-            <a:r>
-              <a:rPr lang="en-US" sz="2400" dirty="0"/>
-              <a:t> and this change is </a:t>
-            </a:r>
-            <a:r>
-              <a:rPr lang="en-US" sz="2400" u="sng" dirty="0"/>
-              <a:t>visible</a:t>
-            </a:r>
-            <a:r>
-              <a:rPr lang="en-US" sz="2400" dirty="0"/>
-              <a:t> through </a:t>
-            </a:r>
-            <a:r>
-              <a:rPr lang="en-US" sz="2400" u="sng" dirty="0"/>
-              <a:t>HEAD</a:t>
-            </a:r>
-            <a:r>
-              <a:rPr lang="en-US" sz="2400" dirty="0"/>
+            <a:pPr marL="0" indent="0" algn="l" fontAlgn="base">
+              <a:buNone/>
+            </a:pPr>
+            <a:r>
+              <a:rPr lang="en-US" sz="1400" b="0" i="0" dirty="0">
+                <a:solidFill>
+                  <a:srgbClr val="15171A"/>
+                </a:solidFill>
+                <a:effectLst/>
+                <a:latin typeface="var(--font-serif)"/>
+              </a:rPr>
+              <a:t>A git HEAD is simply a pointer that points to a specific version or state of a git repository. It can point to either </a:t>
+            </a:r>
+            <a:r>
+              <a:rPr lang="en-US" sz="1400" b="1" i="1" dirty="0">
+                <a:solidFill>
+                  <a:srgbClr val="15171A"/>
+                </a:solidFill>
+                <a:effectLst/>
+                <a:latin typeface="inherit"/>
+              </a:rPr>
+              <a:t>the latest commit on a branch</a:t>
+            </a:r>
+            <a:r>
+              <a:rPr lang="en-US" sz="1400" b="0" i="0" dirty="0">
+                <a:solidFill>
+                  <a:srgbClr val="15171A"/>
+                </a:solidFill>
+                <a:effectLst/>
+                <a:latin typeface="var(--font-serif)"/>
+              </a:rPr>
+              <a:t> or</a:t>
+            </a:r>
+            <a:r>
+              <a:rPr lang="en-US" sz="1400" b="1" i="1" dirty="0">
+                <a:solidFill>
+                  <a:srgbClr val="15171A"/>
+                </a:solidFill>
+                <a:effectLst/>
+                <a:latin typeface="inherit"/>
+              </a:rPr>
+              <a:t> to a specific commit</a:t>
+            </a:r>
+            <a:r>
+              <a:rPr lang="en-US" sz="1400" b="0" i="0" dirty="0">
+                <a:solidFill>
+                  <a:srgbClr val="15171A"/>
+                </a:solidFill>
+                <a:effectLst/>
+                <a:latin typeface="var(--font-serif)"/>
+              </a:rPr>
+              <a:t> </a:t>
+            </a:r>
+            <a:r>
+              <a:rPr lang="en-US" sz="1400" b="1" i="1" dirty="0">
+                <a:solidFill>
+                  <a:srgbClr val="15171A"/>
+                </a:solidFill>
+                <a:effectLst/>
+                <a:latin typeface="inherit"/>
+              </a:rPr>
+              <a:t>directly</a:t>
+            </a:r>
+            <a:r>
+              <a:rPr lang="en-US" sz="1400" b="1" i="0" dirty="0">
+                <a:solidFill>
+                  <a:srgbClr val="15171A"/>
+                </a:solidFill>
+                <a:effectLst/>
+                <a:latin typeface="inherit"/>
+              </a:rPr>
               <a:t>.</a:t>
             </a:r>
-          </a:p>
-          <a:p>
-            <a:endParaRPr lang="en-US" sz="2400" dirty="0"/>
-          </a:p>
-          <a:p>
-            <a:pPr marL="0" indent="0">
+            <a:endParaRPr lang="en-US" sz="1400" b="0" i="0" dirty="0">
+              <a:solidFill>
+                <a:srgbClr val="15171A"/>
+              </a:solidFill>
+              <a:effectLst/>
+              <a:latin typeface="var(--font-serif)"/>
+            </a:endParaRPr>
+          </a:p>
+          <a:p>
+            <a:pPr marL="0" indent="0" algn="l" fontAlgn="base">
               <a:buNone/>
             </a:pPr>
             <a:r>
-              <a:rPr lang="en-US" sz="2400" i="1" dirty="0">
-                <a:solidFill>
-                  <a:srgbClr val="7030A0"/>
-                </a:solidFill>
-              </a:rPr>
-              <a:t> </a:t>
-            </a:r>
-            <a:r>
-              <a:rPr lang="en-US" sz="2400" b="1" i="1" dirty="0">
-                <a:solidFill>
-                  <a:srgbClr val="7030A0"/>
-                </a:solidFill>
-              </a:rPr>
-              <a:t>HEAD</a:t>
-            </a:r>
-            <a:r>
-              <a:rPr lang="en-US" sz="2400" i="1" dirty="0">
-                <a:solidFill>
-                  <a:srgbClr val="7030A0"/>
-                </a:solidFill>
-              </a:rPr>
-              <a:t> was hiding underneath our </a:t>
-            </a:r>
-            <a:r>
-              <a:rPr lang="en-US" sz="2400" b="1" i="1" dirty="0">
-                <a:solidFill>
-                  <a:srgbClr val="7030A0"/>
-                </a:solidFill>
-              </a:rPr>
-              <a:t>main branch </a:t>
-            </a:r>
-            <a:r>
-              <a:rPr lang="en-US" sz="2400" i="1" dirty="0">
-                <a:solidFill>
-                  <a:srgbClr val="7030A0"/>
-                </a:solidFill>
-              </a:rPr>
-              <a:t>all along.</a:t>
+              <a:rPr lang="en-US" sz="1400" b="0" i="0" dirty="0">
+                <a:solidFill>
+                  <a:srgbClr val="15171A"/>
+                </a:solidFill>
+                <a:effectLst/>
+                <a:latin typeface="var(--font-serif)"/>
+              </a:rPr>
+              <a:t>When you</a:t>
+            </a:r>
+            <a:r>
+              <a:rPr lang="en-US" sz="1400" b="0" i="1" dirty="0">
+                <a:solidFill>
+                  <a:srgbClr val="15171A"/>
+                </a:solidFill>
+                <a:effectLst/>
+                <a:latin typeface="inherit"/>
+              </a:rPr>
+              <a:t> </a:t>
+            </a:r>
+            <a:r>
+              <a:rPr lang="en-US" sz="1400" b="1" i="1" dirty="0">
+                <a:solidFill>
+                  <a:srgbClr val="15171A"/>
+                </a:solidFill>
+                <a:effectLst/>
+                <a:latin typeface="inherit"/>
+              </a:rPr>
+              <a:t>switch or checkout to a branch</a:t>
+            </a:r>
+            <a:r>
+              <a:rPr lang="en-US" sz="1400" b="0" i="0" dirty="0">
+                <a:solidFill>
+                  <a:srgbClr val="15171A"/>
+                </a:solidFill>
+                <a:effectLst/>
+                <a:latin typeface="var(--font-serif)"/>
+              </a:rPr>
+              <a:t>, the HEAD points to the latest commit made on that branch. It points to the current or active branch reference. Let’s visualize what a HEAD on a git branch looks like below:</a:t>
+            </a:r>
+          </a:p>
+          <a:p>
+            <a:endParaRPr lang="fa-IR" sz="2000" b="1" i="1" dirty="0">
+              <a:solidFill>
+                <a:srgbClr val="7030A0"/>
+              </a:solidFill>
+            </a:endParaRPr>
+          </a:p>
+          <a:p>
+            <a:endParaRPr lang="fa-IR" sz="2000" b="1" i="1" dirty="0">
+              <a:solidFill>
+                <a:srgbClr val="7030A0"/>
+              </a:solidFill>
+            </a:endParaRPr>
+          </a:p>
+          <a:p>
+            <a:endParaRPr lang="fa-IR" sz="2000" b="1" i="1" dirty="0">
+              <a:solidFill>
+                <a:srgbClr val="7030A0"/>
+              </a:solidFill>
+            </a:endParaRPr>
+          </a:p>
+          <a:p>
+            <a:endParaRPr lang="fa-IR" sz="2000" b="1" i="1" dirty="0">
+              <a:solidFill>
+                <a:srgbClr val="7030A0"/>
+              </a:solidFill>
+            </a:endParaRPr>
+          </a:p>
+          <a:p>
+            <a:pPr marL="0" indent="0" algn="l" fontAlgn="base">
+              <a:buNone/>
+            </a:pPr>
+            <a:endParaRPr lang="fa-IR" sz="1400" b="0" i="0" dirty="0">
+              <a:solidFill>
+                <a:srgbClr val="15171A"/>
+              </a:solidFill>
+              <a:effectLst/>
+              <a:latin typeface="var(--font-serif)"/>
+            </a:endParaRPr>
+          </a:p>
+          <a:p>
+            <a:pPr marL="0" indent="0" algn="l" fontAlgn="base">
+              <a:buNone/>
+            </a:pPr>
+            <a:r>
+              <a:rPr lang="en-US" sz="1400" b="0" i="0" dirty="0">
+                <a:solidFill>
+                  <a:srgbClr val="15171A"/>
+                </a:solidFill>
+                <a:effectLst/>
+                <a:latin typeface="var(--font-serif)"/>
+              </a:rPr>
+              <a:t>The HEAD points to the active branch reference - the </a:t>
+            </a:r>
+            <a:r>
+              <a:rPr lang="en-US" sz="1400" b="1" i="0" dirty="0" err="1">
+                <a:solidFill>
+                  <a:srgbClr val="15171A"/>
+                </a:solidFill>
+                <a:effectLst/>
+                <a:latin typeface="inherit"/>
+              </a:rPr>
+              <a:t>feature_branch</a:t>
+            </a:r>
+            <a:r>
+              <a:rPr lang="en-US" sz="1400" b="1" i="0" dirty="0">
+                <a:solidFill>
+                  <a:srgbClr val="15171A"/>
+                </a:solidFill>
+                <a:effectLst/>
+                <a:latin typeface="inherit"/>
+              </a:rPr>
+              <a:t> </a:t>
+            </a:r>
+            <a:r>
+              <a:rPr lang="en-US" sz="1400" b="0" i="0" dirty="0">
+                <a:solidFill>
+                  <a:srgbClr val="15171A"/>
+                </a:solidFill>
+                <a:effectLst/>
+                <a:latin typeface="var(--font-serif)"/>
+              </a:rPr>
+              <a:t>in this case - where the latest commit is made.</a:t>
             </a:r>
           </a:p>
         </p:txBody>
       </p:sp>
       <p:pic>
         <p:nvPicPr>
-          <p:cNvPr id="5" name="Picture 4">
-            <a:extLst>
-              <a:ext uri="{FF2B5EF4-FFF2-40B4-BE49-F238E27FC236}">
-                <a16:creationId xmlns:a16="http://schemas.microsoft.com/office/drawing/2014/main" id="{FDF96880-C288-FE7B-A33E-1D14579DDDB8}"/>
+          <p:cNvPr id="9" name="Picture 8">
+            <a:extLst>
+              <a:ext uri="{FF2B5EF4-FFF2-40B4-BE49-F238E27FC236}">
+                <a16:creationId xmlns:a16="http://schemas.microsoft.com/office/drawing/2014/main" id="{BB97073C-F190-ED9A-4631-36D52A2BC705}"/>
               </a:ext>
             </a:extLst>
           </p:cNvPr>
@@ -3706,57 +4184,15 @@
           <p:nvPr/>
         </p:nvPicPr>
         <p:blipFill>
-          <a:blip r:embed="rId2">
-            <a:extLst>
-              <a:ext uri="{28A0092B-C50C-407E-A947-70E740481C1C}">
-                <a14:useLocalDpi xmlns:a14="http://schemas.microsoft.com/office/drawing/2010/main" val="0"/>
-              </a:ext>
-            </a:extLst>
-          </a:blip>
+          <a:blip r:embed="rId2"/>
           <a:stretch>
             <a:fillRect/>
           </a:stretch>
         </p:blipFill>
         <p:spPr>
           <a:xfrm>
-            <a:off x="9209388" y="763439"/>
-            <a:ext cx="2210108" cy="2124371"/>
-          </a:xfrm>
-          <a:prstGeom prst="rect">
-            <a:avLst/>
-          </a:prstGeom>
-        </p:spPr>
-      </p:pic>
-      <p:pic>
-        <p:nvPicPr>
-          <p:cNvPr id="7" name="Picture 6">
-            <a:extLst>
-              <a:ext uri="{FF2B5EF4-FFF2-40B4-BE49-F238E27FC236}">
-                <a16:creationId xmlns:a16="http://schemas.microsoft.com/office/drawing/2014/main" id="{96AE9FBA-36E6-4D1E-CDAB-03874138922C}"/>
-              </a:ext>
-            </a:extLst>
-          </p:cNvPr>
-          <p:cNvPicPr>
-            <a:picLocks noChangeAspect="1"/>
-          </p:cNvPicPr>
-          <p:nvPr/>
-        </p:nvPicPr>
-        <p:blipFill>
-          <a:blip r:embed="rId3">
-            <a:extLst>
-              <a:ext uri="{28A0092B-C50C-407E-A947-70E740481C1C}">
-                <a14:useLocalDpi xmlns:a14="http://schemas.microsoft.com/office/drawing/2010/main" val="0"/>
-              </a:ext>
-            </a:extLst>
-          </a:blip>
-          <a:stretch>
-            <a:fillRect/>
-          </a:stretch>
-        </p:blipFill>
-        <p:spPr>
-          <a:xfrm>
-            <a:off x="8656342" y="2950467"/>
-            <a:ext cx="3316201" cy="3042534"/>
+            <a:off x="1502287" y="2950535"/>
+            <a:ext cx="7906889" cy="1603177"/>
           </a:xfrm>
           <a:prstGeom prst="rect">
             <a:avLst/>
@@ -3816,7 +4252,7 @@
           <a:p>
             <a:r>
               <a:rPr lang="en-US" dirty="0"/>
-              <a:t>Detaching HEAD</a:t>
+              <a:t>Detached HEAD State</a:t>
             </a:r>
           </a:p>
         </p:txBody>
@@ -3840,94 +4276,131 @@
         <p:spPr>
           <a:xfrm>
             <a:off x="838200" y="1825625"/>
-            <a:ext cx="7711440" cy="4351338"/>
+            <a:ext cx="10363200" cy="4351338"/>
           </a:xfrm>
         </p:spPr>
         <p:txBody>
-          <a:bodyPr/>
+          <a:bodyPr>
+            <a:normAutofit/>
+          </a:bodyPr>
           <a:lstStyle/>
           <a:p>
             <a:pPr marL="0" indent="0">
               <a:buNone/>
             </a:pPr>
             <a:r>
-              <a:rPr lang="en-US" dirty="0"/>
-              <a:t>Detaching HEAD just means attaching it to a commit instead of a branch. This is what it looks like beforehand:</a:t>
-            </a:r>
+              <a:rPr lang="en-US" sz="2000" dirty="0"/>
+              <a:t>When you are in a git detached HEAD state, </a:t>
+            </a:r>
+            <a:r>
+              <a:rPr lang="en-US" sz="2000" u="sng" dirty="0">
+                <a:solidFill>
+                  <a:srgbClr val="FF0000"/>
+                </a:solidFill>
+              </a:rPr>
+              <a:t>you are not on any branch</a:t>
+            </a:r>
+            <a:r>
+              <a:rPr lang="en-US" sz="2000" dirty="0"/>
+              <a:t>. The HEAD references or points to a </a:t>
+            </a:r>
+            <a:r>
+              <a:rPr lang="en-US" sz="2000" b="1" dirty="0">
+                <a:solidFill>
+                  <a:srgbClr val="00B0F0"/>
+                </a:solidFill>
+              </a:rPr>
+              <a:t>commit</a:t>
+            </a:r>
+            <a:r>
+              <a:rPr lang="en-US" sz="2000" dirty="0"/>
+              <a:t> directly instead of a </a:t>
+            </a:r>
+            <a:r>
+              <a:rPr lang="en-US" sz="2000" b="1" dirty="0">
+                <a:solidFill>
+                  <a:srgbClr val="FF0000"/>
+                </a:solidFill>
+              </a:rPr>
+              <a:t>branch</a:t>
+            </a:r>
+            <a:r>
+              <a:rPr lang="en-US" sz="2000" dirty="0"/>
+              <a:t>. Let’s visualize what a git detached HEAD looks like:</a:t>
+            </a:r>
+            <a:endParaRPr lang="fa-IR" sz="2000" dirty="0"/>
           </a:p>
           <a:p>
             <a:pPr marL="0" indent="0">
               <a:buNone/>
             </a:pPr>
-            <a:r>
-              <a:rPr lang="en-US" dirty="0"/>
-              <a:t>HEAD -&gt; main -&gt; C1</a:t>
-            </a:r>
+            <a:endParaRPr lang="fa-IR" sz="2000" dirty="0"/>
           </a:p>
           <a:p>
             <a:pPr marL="0" indent="0">
               <a:buNone/>
             </a:pPr>
-            <a:endParaRPr lang="en-US" dirty="0"/>
+            <a:endParaRPr lang="fa-IR" sz="2000" dirty="0"/>
           </a:p>
           <a:p>
             <a:pPr marL="0" indent="0">
               <a:buNone/>
             </a:pPr>
-            <a:r>
-              <a:rPr lang="en-US" dirty="0"/>
-              <a:t>&gt; Git </a:t>
-            </a:r>
-            <a:r>
-              <a:rPr lang="en-US"/>
-              <a:t>checkout C1</a:t>
-            </a:r>
-            <a:endParaRPr lang="en-US" dirty="0"/>
+            <a:endParaRPr lang="fa-IR" sz="2000" dirty="0"/>
           </a:p>
           <a:p>
             <a:pPr marL="0" indent="0">
               <a:buNone/>
             </a:pPr>
             <a:r>
-              <a:rPr lang="en-US" dirty="0"/>
-              <a:t>And now it's</a:t>
-            </a:r>
-          </a:p>
-          <a:p>
-            <a:pPr marL="0" indent="0">
-              <a:buNone/>
-            </a:pPr>
-            <a:r>
-              <a:rPr lang="en-US" dirty="0"/>
-              <a:t>HEAD -&gt; C1</a:t>
-            </a:r>
-          </a:p>
-          <a:p>
-            <a:pPr marL="0" indent="0">
-              <a:buNone/>
-            </a:pPr>
-            <a:endParaRPr lang="en-US" dirty="0"/>
-          </a:p>
-          <a:p>
-            <a:pPr marL="0" indent="0">
-              <a:buNone/>
-            </a:pPr>
-            <a:endParaRPr lang="en-US" dirty="0"/>
-          </a:p>
-          <a:p>
-            <a:pPr marL="0" indent="0">
-              <a:buNone/>
-            </a:pPr>
-            <a:endParaRPr lang="en-US" dirty="0"/>
+              <a:rPr lang="en-US" sz="2000" dirty="0"/>
+              <a:t>From the image above, we switched or checked out to the commit hash, </a:t>
+            </a:r>
+            <a:r>
+              <a:rPr lang="en-US" sz="2000" i="1" dirty="0"/>
+              <a:t>935baeb</a:t>
+            </a:r>
+            <a:r>
+              <a:rPr lang="en-US" sz="2000" dirty="0"/>
+              <a:t>. The HEAD moved from the </a:t>
+            </a:r>
+            <a:r>
+              <a:rPr lang="en-US" sz="2000" i="1" dirty="0" err="1"/>
+              <a:t>feature_branch</a:t>
+            </a:r>
+            <a:r>
+              <a:rPr lang="en-US" sz="2000" i="1" dirty="0"/>
+              <a:t> </a:t>
+            </a:r>
+            <a:r>
+              <a:rPr lang="en-US" sz="2000" dirty="0"/>
+              <a:t>reference to now point directly to the commit with hash </a:t>
+            </a:r>
+            <a:r>
+              <a:rPr lang="en-US" sz="2000" i="1" dirty="0"/>
+              <a:t>935baeb</a:t>
+            </a:r>
+            <a:r>
+              <a:rPr lang="en-US" sz="2000" dirty="0"/>
+              <a:t>, which is not on any branch.</a:t>
+            </a:r>
+            <a:r>
+              <a:rPr lang="fa-IR" sz="2000" dirty="0"/>
+              <a:t> </a:t>
+            </a:r>
+            <a:r>
+              <a:rPr lang="en-US" sz="2000" dirty="0"/>
+              <a:t>You can still create more commits when in a git detached HEAD state. </a:t>
+            </a:r>
           </a:p>
         </p:txBody>
       </p:sp>
       <p:pic>
         <p:nvPicPr>
-          <p:cNvPr id="5" name="Picture 4">
-            <a:extLst>
-              <a:ext uri="{FF2B5EF4-FFF2-40B4-BE49-F238E27FC236}">
-                <a16:creationId xmlns:a16="http://schemas.microsoft.com/office/drawing/2014/main" id="{263A8CE3-1290-44B3-765D-76D5925AB2B3}"/>
+          <p:cNvPr id="8" name="Picture 7">
+            <a:extLst>
+              <a:ext uri="{FF2B5EF4-FFF2-40B4-BE49-F238E27FC236}">
+                <a16:creationId xmlns:a16="http://schemas.microsoft.com/office/drawing/2014/main" id="{4BCB2083-A1BA-8511-2FA0-D66F3BF26332}"/>
               </a:ext>
             </a:extLst>
           </p:cNvPr>
@@ -3937,21 +4410,15 @@
           <p:nvPr/>
         </p:nvPicPr>
         <p:blipFill>
-          <a:blip r:embed="rId2">
-            <a:extLst>
-              <a:ext uri="{28A0092B-C50C-407E-A947-70E740481C1C}">
-                <a14:useLocalDpi xmlns:a14="http://schemas.microsoft.com/office/drawing/2010/main" val="0"/>
-              </a:ext>
-            </a:extLst>
-          </a:blip>
+          <a:blip r:embed="rId2"/>
           <a:stretch>
             <a:fillRect/>
           </a:stretch>
         </p:blipFill>
         <p:spPr>
           <a:xfrm>
-            <a:off x="9297770" y="295457"/>
-            <a:ext cx="2210108" cy="2124371"/>
+            <a:off x="2999232" y="2574765"/>
+            <a:ext cx="5558803" cy="1174276"/>
           </a:xfrm>
           <a:prstGeom prst="rect">
             <a:avLst/>
@@ -3960,10 +4427,10 @@
       </p:pic>
       <p:pic>
         <p:nvPicPr>
-          <p:cNvPr id="7" name="Picture 6">
-            <a:extLst>
-              <a:ext uri="{FF2B5EF4-FFF2-40B4-BE49-F238E27FC236}">
-                <a16:creationId xmlns:a16="http://schemas.microsoft.com/office/drawing/2014/main" id="{24F495A3-D1CF-79C6-E6CA-F4629071736F}"/>
+          <p:cNvPr id="9" name="Picture 8">
+            <a:extLst>
+              <a:ext uri="{FF2B5EF4-FFF2-40B4-BE49-F238E27FC236}">
+                <a16:creationId xmlns:a16="http://schemas.microsoft.com/office/drawing/2014/main" id="{CF844FEB-76DF-0F5B-929C-CEF5BF03652C}"/>
               </a:ext>
             </a:extLst>
           </p:cNvPr>
@@ -3973,21 +4440,15 @@
           <p:nvPr/>
         </p:nvPicPr>
         <p:blipFill>
-          <a:blip r:embed="rId3">
-            <a:extLst>
-              <a:ext uri="{28A0092B-C50C-407E-A947-70E740481C1C}">
-                <a14:useLocalDpi xmlns:a14="http://schemas.microsoft.com/office/drawing/2010/main" val="0"/>
-              </a:ext>
-            </a:extLst>
-          </a:blip>
+          <a:blip r:embed="rId3"/>
           <a:stretch>
             <a:fillRect/>
           </a:stretch>
         </p:blipFill>
         <p:spPr>
           <a:xfrm>
-            <a:off x="9027974" y="2572156"/>
-            <a:ext cx="2896004" cy="2372056"/>
+            <a:off x="2761488" y="4653778"/>
+            <a:ext cx="5202936" cy="1944129"/>
           </a:xfrm>
           <a:prstGeom prst="rect">
             <a:avLst/>
@@ -3998,6 +4459,516 @@
     <p:extLst>
       <p:ext uri="{BB962C8B-B14F-4D97-AF65-F5344CB8AC3E}">
         <p14:creationId xmlns:p14="http://schemas.microsoft.com/office/powerpoint/2010/main" val="4011611903"/>
+      </p:ext>
+    </p:extLst>
+  </p:cSld>
+  <p:clrMapOvr>
+    <a:masterClrMapping/>
+  </p:clrMapOvr>
+</p:sld>
+</file>
+
+<file path=ppt/slides/slide13.xml><?xml version="1.0" encoding="utf-8"?>
+<p:sld xmlns:a="http://schemas.openxmlformats.org/drawingml/2006/main" xmlns:r="http://schemas.openxmlformats.org/officeDocument/2006/relationships" xmlns:p="http://schemas.openxmlformats.org/presentationml/2006/main">
+  <p:cSld>
+    <p:spTree>
+      <p:nvGrpSpPr>
+        <p:cNvPr id="1" name=""/>
+        <p:cNvGrpSpPr/>
+        <p:nvPr/>
+      </p:nvGrpSpPr>
+      <p:grpSpPr>
+        <a:xfrm>
+          <a:off x="0" y="0"/>
+          <a:ext cx="0" cy="0"/>
+          <a:chOff x="0" y="0"/>
+          <a:chExt cx="0" cy="0"/>
+        </a:xfrm>
+      </p:grpSpPr>
+      <p:sp>
+        <p:nvSpPr>
+          <p:cNvPr id="2" name="Title 1">
+            <a:extLst>
+              <a:ext uri="{FF2B5EF4-FFF2-40B4-BE49-F238E27FC236}">
+                <a16:creationId xmlns:a16="http://schemas.microsoft.com/office/drawing/2014/main" id="{5B75D42A-A4AB-793C-B1E5-F5C6706CB9A9}"/>
+              </a:ext>
+            </a:extLst>
+          </p:cNvPr>
+          <p:cNvSpPr>
+            <a:spLocks noGrp="1"/>
+          </p:cNvSpPr>
+          <p:nvPr>
+            <p:ph type="title"/>
+          </p:nvPr>
+        </p:nvSpPr>
+        <p:spPr/>
+        <p:txBody>
+          <a:bodyPr/>
+          <a:lstStyle/>
+          <a:p>
+            <a:r>
+              <a:rPr lang="en-US" dirty="0"/>
+              <a:t>Detaching Head : Command</a:t>
+            </a:r>
+          </a:p>
+        </p:txBody>
+      </p:sp>
+      <p:sp>
+        <p:nvSpPr>
+          <p:cNvPr id="3" name="Content Placeholder 2">
+            <a:extLst>
+              <a:ext uri="{FF2B5EF4-FFF2-40B4-BE49-F238E27FC236}">
+                <a16:creationId xmlns:a16="http://schemas.microsoft.com/office/drawing/2014/main" id="{268CEEBE-775A-DE48-B085-64CE4051D691}"/>
+              </a:ext>
+            </a:extLst>
+          </p:cNvPr>
+          <p:cNvSpPr>
+            <a:spLocks noGrp="1"/>
+          </p:cNvSpPr>
+          <p:nvPr>
+            <p:ph idx="1"/>
+          </p:nvPr>
+        </p:nvSpPr>
+        <p:spPr/>
+        <p:txBody>
+          <a:bodyPr>
+            <a:normAutofit/>
+          </a:bodyPr>
+          <a:lstStyle/>
+          <a:p>
+            <a:pPr marL="0" indent="0">
+              <a:buNone/>
+            </a:pPr>
+            <a:r>
+              <a:rPr lang="en-US" sz="2000" i="1" dirty="0"/>
+              <a:t>1) g</a:t>
+            </a:r>
+            <a:r>
+              <a:rPr lang="en-US" sz="2000" dirty="0"/>
+              <a:t>it switch </a:t>
+            </a:r>
+            <a:r>
+              <a:rPr lang="en-US" sz="2000" i="1" dirty="0">
+                <a:solidFill>
+                  <a:schemeClr val="tx1">
+                    <a:lumMod val="50000"/>
+                    <a:lumOff val="50000"/>
+                  </a:schemeClr>
+                </a:solidFill>
+              </a:rPr>
+              <a:t>&lt;</a:t>
+            </a:r>
+            <a:r>
+              <a:rPr lang="en-US" sz="2000" i="1" dirty="0" err="1">
+                <a:solidFill>
+                  <a:schemeClr val="tx1">
+                    <a:lumMod val="50000"/>
+                    <a:lumOff val="50000"/>
+                  </a:schemeClr>
+                </a:solidFill>
+              </a:rPr>
+              <a:t>commit_hash</a:t>
+            </a:r>
+            <a:r>
+              <a:rPr lang="en-US" sz="2000" i="1" dirty="0">
+                <a:solidFill>
+                  <a:schemeClr val="tx1">
+                    <a:lumMod val="50000"/>
+                    <a:lumOff val="50000"/>
+                  </a:schemeClr>
+                </a:solidFill>
+              </a:rPr>
+              <a:t>&gt;</a:t>
+            </a:r>
+            <a:r>
+              <a:rPr lang="en-US" sz="2000" i="1" dirty="0"/>
+              <a:t> </a:t>
+            </a:r>
+            <a:r>
+              <a:rPr lang="en-US" sz="2000" dirty="0"/>
+              <a:t>or git checkout </a:t>
+            </a:r>
+            <a:r>
+              <a:rPr lang="en-US" sz="2000" i="1" dirty="0">
+                <a:solidFill>
+                  <a:schemeClr val="tx1">
+                    <a:lumMod val="50000"/>
+                    <a:lumOff val="50000"/>
+                  </a:schemeClr>
+                </a:solidFill>
+              </a:rPr>
+              <a:t>&lt;</a:t>
+            </a:r>
+            <a:r>
+              <a:rPr lang="en-US" sz="2000" i="1" dirty="0" err="1">
+                <a:solidFill>
+                  <a:schemeClr val="tx1">
+                    <a:lumMod val="50000"/>
+                    <a:lumOff val="50000"/>
+                  </a:schemeClr>
+                </a:solidFill>
+              </a:rPr>
+              <a:t>commit_hash</a:t>
+            </a:r>
+            <a:r>
+              <a:rPr lang="en-US" sz="2000" i="1" dirty="0">
+                <a:solidFill>
+                  <a:schemeClr val="tx1">
+                    <a:lumMod val="50000"/>
+                    <a:lumOff val="50000"/>
+                  </a:schemeClr>
+                </a:solidFill>
+              </a:rPr>
+              <a:t>&gt;</a:t>
+            </a:r>
+          </a:p>
+          <a:p>
+            <a:pPr marL="0" indent="0">
+              <a:buNone/>
+            </a:pPr>
+            <a:r>
+              <a:rPr lang="en-US" sz="1600" b="1" i="1" dirty="0">
+                <a:solidFill>
+                  <a:schemeClr val="tx1">
+                    <a:lumMod val="50000"/>
+                    <a:lumOff val="50000"/>
+                  </a:schemeClr>
+                </a:solidFill>
+              </a:rPr>
+              <a:t>Note: </a:t>
+            </a:r>
+            <a:r>
+              <a:rPr lang="en-US" sz="1600" i="1" dirty="0">
+                <a:solidFill>
+                  <a:schemeClr val="tx1">
+                    <a:lumMod val="50000"/>
+                    <a:lumOff val="50000"/>
+                  </a:schemeClr>
+                </a:solidFill>
+              </a:rPr>
+              <a:t>When you switch or check out directly to a commit via its hash, it puts you in a git detached HEAD state</a:t>
+            </a:r>
+          </a:p>
+          <a:p>
+            <a:pPr marL="0" indent="0">
+              <a:buNone/>
+            </a:pPr>
+            <a:r>
+              <a:rPr lang="en-US" sz="2000" i="1" dirty="0"/>
+              <a:t>2) </a:t>
+            </a:r>
+            <a:r>
+              <a:rPr lang="en-US" sz="2000" dirty="0"/>
+              <a:t>git switch </a:t>
+            </a:r>
+            <a:r>
+              <a:rPr lang="en-US" sz="2000" i="1" dirty="0">
+                <a:solidFill>
+                  <a:schemeClr val="tx1">
+                    <a:lumMod val="50000"/>
+                    <a:lumOff val="50000"/>
+                  </a:schemeClr>
+                </a:solidFill>
+              </a:rPr>
+              <a:t>&lt;</a:t>
+            </a:r>
+            <a:r>
+              <a:rPr lang="en-US" sz="2000" i="1" dirty="0" err="1">
+                <a:solidFill>
+                  <a:schemeClr val="tx1">
+                    <a:lumMod val="50000"/>
+                    <a:lumOff val="50000"/>
+                  </a:schemeClr>
+                </a:solidFill>
+              </a:rPr>
+              <a:t>relative_commit_reference</a:t>
+            </a:r>
+            <a:r>
+              <a:rPr lang="en-US" sz="2000" i="1" dirty="0">
+                <a:solidFill>
+                  <a:schemeClr val="tx1">
+                    <a:lumMod val="50000"/>
+                    <a:lumOff val="50000"/>
+                  </a:schemeClr>
+                </a:solidFill>
+              </a:rPr>
+              <a:t>&gt; </a:t>
+            </a:r>
+            <a:r>
+              <a:rPr lang="en-US" sz="2000" dirty="0"/>
+              <a:t>or git checkout </a:t>
+            </a:r>
+            <a:r>
+              <a:rPr lang="en-US" sz="2000" i="1" dirty="0">
+                <a:solidFill>
+                  <a:schemeClr val="tx1">
+                    <a:lumMod val="50000"/>
+                    <a:lumOff val="50000"/>
+                  </a:schemeClr>
+                </a:solidFill>
+              </a:rPr>
+              <a:t>&lt;</a:t>
+            </a:r>
+            <a:r>
+              <a:rPr lang="en-US" sz="2000" i="1" dirty="0" err="1">
+                <a:solidFill>
+                  <a:schemeClr val="tx1">
+                    <a:lumMod val="50000"/>
+                    <a:lumOff val="50000"/>
+                  </a:schemeClr>
+                </a:solidFill>
+              </a:rPr>
+              <a:t>relative_commit_reference</a:t>
+            </a:r>
+            <a:r>
+              <a:rPr lang="en-US" sz="2000" i="1" dirty="0">
+                <a:solidFill>
+                  <a:schemeClr val="tx1">
+                    <a:lumMod val="50000"/>
+                    <a:lumOff val="50000"/>
+                  </a:schemeClr>
+                </a:solidFill>
+              </a:rPr>
+              <a:t>&gt;</a:t>
+            </a:r>
+          </a:p>
+        </p:txBody>
+      </p:sp>
+      <p:pic>
+        <p:nvPicPr>
+          <p:cNvPr id="4" name="Picture 3">
+            <a:extLst>
+              <a:ext uri="{FF2B5EF4-FFF2-40B4-BE49-F238E27FC236}">
+                <a16:creationId xmlns:a16="http://schemas.microsoft.com/office/drawing/2014/main" id="{943FB26C-61D1-75EB-3954-B3DFCA18A6BE}"/>
+              </a:ext>
+            </a:extLst>
+          </p:cNvPr>
+          <p:cNvPicPr>
+            <a:picLocks noChangeAspect="1"/>
+          </p:cNvPicPr>
+          <p:nvPr/>
+        </p:nvPicPr>
+        <p:blipFill>
+          <a:blip r:embed="rId2"/>
+          <a:stretch>
+            <a:fillRect/>
+          </a:stretch>
+        </p:blipFill>
+        <p:spPr>
+          <a:xfrm>
+            <a:off x="1245869" y="3348990"/>
+            <a:ext cx="6501881" cy="1433322"/>
+          </a:xfrm>
+          <a:prstGeom prst="rect">
+            <a:avLst/>
+          </a:prstGeom>
+        </p:spPr>
+      </p:pic>
+      <p:pic>
+        <p:nvPicPr>
+          <p:cNvPr id="5" name="Picture 4">
+            <a:extLst>
+              <a:ext uri="{FF2B5EF4-FFF2-40B4-BE49-F238E27FC236}">
+                <a16:creationId xmlns:a16="http://schemas.microsoft.com/office/drawing/2014/main" id="{E704137F-9791-1D6F-724A-1DC6CA7054E2}"/>
+              </a:ext>
+            </a:extLst>
+          </p:cNvPr>
+          <p:cNvPicPr>
+            <a:picLocks noChangeAspect="1"/>
+          </p:cNvPicPr>
+          <p:nvPr/>
+        </p:nvPicPr>
+        <p:blipFill>
+          <a:blip r:embed="rId3"/>
+          <a:stretch>
+            <a:fillRect/>
+          </a:stretch>
+        </p:blipFill>
+        <p:spPr>
+          <a:xfrm>
+            <a:off x="1192427" y="4980114"/>
+            <a:ext cx="6555323" cy="1325563"/>
+          </a:xfrm>
+          <a:prstGeom prst="rect">
+            <a:avLst/>
+          </a:prstGeom>
+        </p:spPr>
+      </p:pic>
+      <p:sp>
+        <p:nvSpPr>
+          <p:cNvPr id="6" name="TextBox 5">
+            <a:extLst>
+              <a:ext uri="{FF2B5EF4-FFF2-40B4-BE49-F238E27FC236}">
+                <a16:creationId xmlns:a16="http://schemas.microsoft.com/office/drawing/2014/main" id="{D6E2E108-EE0F-6973-DC84-7EFBEEDD2A7D}"/>
+              </a:ext>
+            </a:extLst>
+          </p:cNvPr>
+          <p:cNvSpPr txBox="1"/>
+          <p:nvPr/>
+        </p:nvSpPr>
+        <p:spPr>
+          <a:xfrm>
+            <a:off x="8101977" y="5253633"/>
+            <a:ext cx="2606040" cy="923330"/>
+          </a:xfrm>
+          <a:prstGeom prst="rect">
+            <a:avLst/>
+          </a:prstGeom>
+          <a:noFill/>
+        </p:spPr>
+        <p:txBody>
+          <a:bodyPr wrap="square" rtlCol="0">
+            <a:spAutoFit/>
+          </a:bodyPr>
+          <a:lstStyle/>
+          <a:p>
+            <a:r>
+              <a:rPr lang="en-US" dirty="0"/>
+              <a:t>1) git checkout b7b2559</a:t>
+            </a:r>
+          </a:p>
+          <a:p>
+            <a:r>
+              <a:rPr lang="en-US" dirty="0"/>
+              <a:t> </a:t>
+            </a:r>
+          </a:p>
+          <a:p>
+            <a:r>
+              <a:rPr lang="en-US" dirty="0"/>
+              <a:t>2) git checkout HEAD~2</a:t>
+            </a:r>
+          </a:p>
+        </p:txBody>
+      </p:sp>
+      <p:sp>
+        <p:nvSpPr>
+          <p:cNvPr id="9" name="TextBox 8">
+            <a:extLst>
+              <a:ext uri="{FF2B5EF4-FFF2-40B4-BE49-F238E27FC236}">
+                <a16:creationId xmlns:a16="http://schemas.microsoft.com/office/drawing/2014/main" id="{D3A8B6DA-CCBE-EC3E-AE76-BB72B12B746F}"/>
+              </a:ext>
+            </a:extLst>
+          </p:cNvPr>
+          <p:cNvSpPr txBox="1"/>
+          <p:nvPr/>
+        </p:nvSpPr>
+        <p:spPr>
+          <a:xfrm>
+            <a:off x="877558" y="6492875"/>
+            <a:ext cx="6094476" cy="646331"/>
+          </a:xfrm>
+          <a:prstGeom prst="rect">
+            <a:avLst/>
+          </a:prstGeom>
+          <a:noFill/>
+        </p:spPr>
+        <p:txBody>
+          <a:bodyPr wrap="square">
+            <a:spAutoFit/>
+          </a:bodyPr>
+          <a:lstStyle/>
+          <a:p>
+            <a:r>
+              <a:rPr lang="en-US" dirty="0">
+                <a:hlinkClick r:id="rId4"/>
+              </a:rPr>
+              <a:t>https://kodekloud.com/blog/git-detached-head/</a:t>
+            </a:r>
+            <a:endParaRPr lang="en-US" dirty="0"/>
+          </a:p>
+          <a:p>
+            <a:endParaRPr lang="en-US" dirty="0"/>
+          </a:p>
+        </p:txBody>
+      </p:sp>
+    </p:spTree>
+    <p:extLst>
+      <p:ext uri="{BB962C8B-B14F-4D97-AF65-F5344CB8AC3E}">
+        <p14:creationId xmlns:p14="http://schemas.microsoft.com/office/powerpoint/2010/main" val="1563033551"/>
+      </p:ext>
+    </p:extLst>
+  </p:cSld>
+  <p:clrMapOvr>
+    <a:masterClrMapping/>
+  </p:clrMapOvr>
+</p:sld>
+</file>
+
+<file path=ppt/slides/slide14.xml><?xml version="1.0" encoding="utf-8"?>
+<p:sld xmlns:a="http://schemas.openxmlformats.org/drawingml/2006/main" xmlns:r="http://schemas.openxmlformats.org/officeDocument/2006/relationships" xmlns:p="http://schemas.openxmlformats.org/presentationml/2006/main">
+  <p:cSld>
+    <p:spTree>
+      <p:nvGrpSpPr>
+        <p:cNvPr id="1" name=""/>
+        <p:cNvGrpSpPr/>
+        <p:nvPr/>
+      </p:nvGrpSpPr>
+      <p:grpSpPr>
+        <a:xfrm>
+          <a:off x="0" y="0"/>
+          <a:ext cx="0" cy="0"/>
+          <a:chOff x="0" y="0"/>
+          <a:chExt cx="0" cy="0"/>
+        </a:xfrm>
+      </p:grpSpPr>
+      <p:sp>
+        <p:nvSpPr>
+          <p:cNvPr id="2" name="Title 1">
+            <a:extLst>
+              <a:ext uri="{FF2B5EF4-FFF2-40B4-BE49-F238E27FC236}">
+                <a16:creationId xmlns:a16="http://schemas.microsoft.com/office/drawing/2014/main" id="{21959B6B-4B84-B344-F0DB-E023BA3D2D68}"/>
+              </a:ext>
+            </a:extLst>
+          </p:cNvPr>
+          <p:cNvSpPr>
+            <a:spLocks noGrp="1"/>
+          </p:cNvSpPr>
+          <p:nvPr>
+            <p:ph type="title"/>
+          </p:nvPr>
+        </p:nvSpPr>
+        <p:spPr/>
+        <p:txBody>
+          <a:bodyPr/>
+          <a:lstStyle/>
+          <a:p>
+            <a:r>
+              <a:rPr lang="en-US" dirty="0"/>
+              <a:t>Relative Refs</a:t>
+            </a:r>
+          </a:p>
+        </p:txBody>
+      </p:sp>
+      <p:sp>
+        <p:nvSpPr>
+          <p:cNvPr id="3" name="Content Placeholder 2">
+            <a:extLst>
+              <a:ext uri="{FF2B5EF4-FFF2-40B4-BE49-F238E27FC236}">
+                <a16:creationId xmlns:a16="http://schemas.microsoft.com/office/drawing/2014/main" id="{30113698-9980-1AAF-9782-E811D93891F4}"/>
+              </a:ext>
+            </a:extLst>
+          </p:cNvPr>
+          <p:cNvSpPr>
+            <a:spLocks noGrp="1"/>
+          </p:cNvSpPr>
+          <p:nvPr>
+            <p:ph idx="1"/>
+          </p:nvPr>
+        </p:nvSpPr>
+        <p:spPr/>
+        <p:txBody>
+          <a:bodyPr/>
+          <a:lstStyle/>
+          <a:p>
+            <a:endParaRPr lang="en-US"/>
+          </a:p>
+        </p:txBody>
+      </p:sp>
+    </p:spTree>
+    <p:extLst>
+      <p:ext uri="{BB962C8B-B14F-4D97-AF65-F5344CB8AC3E}">
+        <p14:creationId xmlns:p14="http://schemas.microsoft.com/office/powerpoint/2010/main" val="1568203340"/>
       </p:ext>
     </p:extLst>
   </p:cSld>
@@ -4684,10 +5655,10 @@
           <a:p>
             <a:r>
               <a:rPr lang="en-US" dirty="0"/>
-              <a:t>Git checkout &lt;</a:t>
-            </a:r>
-            <a:r>
-              <a:rPr lang="en-US" i="1" dirty="0">
+              <a:t>Git checkout </a:t>
+            </a:r>
+            <a:r>
+              <a:rPr lang="en-US" dirty="0">
                 <a:solidFill>
                   <a:schemeClr val="tx1">
                     <a:lumMod val="50000"/>
@@ -4695,35 +5666,7 @@
                   </a:schemeClr>
                 </a:solidFill>
               </a:rPr>
-              <a:t>name</a:t>
-            </a:r>
-            <a:r>
-              <a:rPr lang="en-US" dirty="0"/>
-              <a:t>&gt;</a:t>
-            </a:r>
-          </a:p>
-          <a:p>
-            <a:r>
-              <a:rPr lang="en-US" dirty="0"/>
-              <a:t>Git switch (</a:t>
-            </a:r>
-            <a:r>
-              <a:rPr lang="en-US" b="1" dirty="0">
-                <a:solidFill>
-                  <a:srgbClr val="FFC000"/>
-                </a:solidFill>
-              </a:rPr>
-              <a:t>NEW *</a:t>
-            </a:r>
-            <a:r>
-              <a:rPr lang="en-US" dirty="0"/>
-              <a:t>)</a:t>
-            </a:r>
-          </a:p>
-          <a:p>
-            <a:r>
-              <a:rPr lang="en-US" dirty="0"/>
-              <a:t>git checkout -b [</a:t>
+              <a:t>&lt;branch-</a:t>
             </a:r>
             <a:r>
               <a:rPr lang="en-US" i="1" dirty="0">
@@ -4734,10 +5677,74 @@
                   </a:schemeClr>
                 </a:solidFill>
               </a:rPr>
-              <a:t>your-branch-name</a:t>
-            </a:r>
+              <a:t>name</a:t>
+            </a:r>
+            <a:r>
+              <a:rPr lang="en-US" dirty="0">
+                <a:solidFill>
+                  <a:schemeClr val="tx1">
+                    <a:lumMod val="50000"/>
+                    <a:lumOff val="50000"/>
+                  </a:schemeClr>
+                </a:solidFill>
+              </a:rPr>
+              <a:t>&gt;</a:t>
+            </a:r>
+          </a:p>
+          <a:p>
             <a:r>
               <a:rPr lang="en-US" dirty="0"/>
+              <a:t>Git switch (</a:t>
+            </a:r>
+            <a:r>
+              <a:rPr lang="en-US" b="1" dirty="0">
+                <a:solidFill>
+                  <a:srgbClr val="FFC000"/>
+                </a:solidFill>
+              </a:rPr>
+              <a:t>NEW *</a:t>
+            </a:r>
+            <a:r>
+              <a:rPr lang="en-US" dirty="0"/>
+              <a:t>)</a:t>
+            </a:r>
+          </a:p>
+          <a:p>
+            <a:r>
+              <a:rPr lang="en-US" dirty="0"/>
+              <a:t>git checkout -b </a:t>
+            </a:r>
+            <a:r>
+              <a:rPr lang="en-US" dirty="0">
+                <a:solidFill>
+                  <a:schemeClr val="tx1">
+                    <a:lumMod val="50000"/>
+                    <a:lumOff val="50000"/>
+                  </a:schemeClr>
+                </a:solidFill>
+              </a:rPr>
+              <a:t>[&lt;</a:t>
+            </a:r>
+            <a:r>
+              <a:rPr lang="en-US" i="1" dirty="0">
+                <a:solidFill>
+                  <a:schemeClr val="tx1">
+                    <a:lumMod val="50000"/>
+                    <a:lumOff val="50000"/>
+                  </a:schemeClr>
+                </a:solidFill>
+              </a:rPr>
+              <a:t>your-branch-name&gt;</a:t>
+            </a:r>
+            <a:r>
+              <a:rPr lang="en-US" dirty="0">
+                <a:solidFill>
+                  <a:schemeClr val="tx1">
+                    <a:lumMod val="50000"/>
+                    <a:lumOff val="50000"/>
+                  </a:schemeClr>
+                </a:solidFill>
+              </a:rPr>
               <a:t>] </a:t>
             </a:r>
             <a:r>
@@ -4925,7 +5932,7 @@
                   </a:schemeClr>
                 </a:solidFill>
               </a:rPr>
-              <a:t>//merge main into </a:t>
+              <a:t>Merge main into </a:t>
             </a:r>
             <a:r>
               <a:rPr lang="en-US" sz="1800" i="1" dirty="0" err="1">
@@ -4963,7 +5970,29 @@
                   </a:schemeClr>
                 </a:solidFill>
               </a:rPr>
-              <a:t>&gt; Git merge main </a:t>
+              <a:t>&gt; git merge </a:t>
+            </a:r>
+            <a:r>
+              <a:rPr lang="en-US" sz="1800" dirty="0" err="1">
+                <a:solidFill>
+                  <a:schemeClr val="tx1">
+                    <a:lumMod val="50000"/>
+                    <a:lumOff val="50000"/>
+                  </a:schemeClr>
+                </a:solidFill>
+              </a:rPr>
+              <a:t>bugFix</a:t>
+            </a:r>
+            <a:r>
+              <a:rPr lang="en-US" sz="1800" dirty="0">
+                <a:solidFill>
+                  <a:schemeClr val="tx1">
+                    <a:lumMod val="50000"/>
+                    <a:lumOff val="50000"/>
+                  </a:schemeClr>
+                </a:solidFill>
+              </a:rPr>
+              <a:t> </a:t>
             </a:r>
           </a:p>
           <a:p>
@@ -5127,7 +6156,18 @@
           <a:p>
             <a:r>
               <a:rPr lang="en-US" dirty="0"/>
-              <a:t>Git merge &lt;</a:t>
+              <a:t>Git merge </a:t>
+            </a:r>
+            <a:r>
+              <a:rPr lang="en-US" dirty="0">
+                <a:solidFill>
+                  <a:schemeClr val="tx1">
+                    <a:lumMod val="50000"/>
+                    <a:lumOff val="50000"/>
+                  </a:schemeClr>
+                </a:solidFill>
+              </a:rPr>
+              <a:t>&lt;</a:t>
             </a:r>
             <a:r>
               <a:rPr lang="en-US" sz="2400" i="1" dirty="0">
@@ -5158,7 +6198,14 @@
               <a:t>-branch</a:t>
             </a:r>
             <a:r>
-              <a:rPr lang="en-US" dirty="0"/>
+              <a:rPr lang="en-US" dirty="0">
+                <a:solidFill>
+                  <a:schemeClr val="tx1">
+                    <a:lumMod val="50000"/>
+                    <a:lumOff val="50000"/>
+                  </a:schemeClr>
+                </a:solidFill>
+              </a:rPr>
               <a:t>&gt;</a:t>
             </a:r>
           </a:p>
@@ -5471,7 +6518,7 @@
                   </a:schemeClr>
                 </a:solidFill>
               </a:rPr>
-              <a:t>&gt;Git rebase main  </a:t>
+              <a:t>&gt;git rebase main  </a:t>
             </a:r>
           </a:p>
           <a:p>
@@ -5540,7 +6587,7 @@
                   </a:schemeClr>
                 </a:solidFill>
               </a:rPr>
-              <a:t>&gt; Git checkout main</a:t>
+              <a:t>&gt; git checkout main</a:t>
             </a:r>
           </a:p>
           <a:p>
@@ -5556,7 +6603,7 @@
                   </a:schemeClr>
                 </a:solidFill>
               </a:rPr>
-              <a:t>&gt; Git merge </a:t>
+              <a:t>&gt; git merge </a:t>
             </a:r>
             <a:r>
               <a:rPr lang="en-US" sz="2000" dirty="0" err="1">
@@ -6142,4 +7189,299 @@
     </a:ext>
   </a:extLst>
 </a:theme>
+</file>
+
+<file path=ppt/theme/theme2.xml><?xml version="1.0" encoding="utf-8"?>
+<a:theme xmlns:a="http://schemas.openxmlformats.org/drawingml/2006/main" name="Office Theme">
+  <a:themeElements>
+    <a:clrScheme name="Office">
+      <a:dk1>
+        <a:sysClr val="windowText" lastClr="000000"/>
+      </a:dk1>
+      <a:lt1>
+        <a:sysClr val="window" lastClr="FFFFFF"/>
+      </a:lt1>
+      <a:dk2>
+        <a:srgbClr val="44546A"/>
+      </a:dk2>
+      <a:lt2>
+        <a:srgbClr val="E7E6E6"/>
+      </a:lt2>
+      <a:accent1>
+        <a:srgbClr val="4472C4"/>
+      </a:accent1>
+      <a:accent2>
+        <a:srgbClr val="ED7D31"/>
+      </a:accent2>
+      <a:accent3>
+        <a:srgbClr val="A5A5A5"/>
+      </a:accent3>
+      <a:accent4>
+        <a:srgbClr val="FFC000"/>
+      </a:accent4>
+      <a:accent5>
+        <a:srgbClr val="5B9BD5"/>
+      </a:accent5>
+      <a:accent6>
+        <a:srgbClr val="70AD47"/>
+      </a:accent6>
+      <a:hlink>
+        <a:srgbClr val="0563C1"/>
+      </a:hlink>
+      <a:folHlink>
+        <a:srgbClr val="954F72"/>
+      </a:folHlink>
+    </a:clrScheme>
+    <a:fontScheme name="Office">
+      <a:majorFont>
+        <a:latin typeface="Calibri Light" panose="020F0302020204030204"/>
+        <a:ea typeface=""/>
+        <a:cs typeface=""/>
+        <a:font script="Jpan" typeface="游ゴシック Light"/>
+        <a:font script="Hang" typeface="맑은 고딕"/>
+        <a:font script="Hans" typeface="等线 Light"/>
+        <a:font script="Hant" typeface="新細明體"/>
+        <a:font script="Arab" typeface="Times New Roman"/>
+        <a:font script="Hebr" typeface="Times New Roman"/>
+        <a:font script="Thai" typeface="Angsana New"/>
+        <a:font script="Ethi" typeface="Nyala"/>
+        <a:font script="Beng" typeface="Vrinda"/>
+        <a:font script="Gujr" typeface="Shruti"/>
+        <a:font script="Khmr" typeface="MoolBoran"/>
+        <a:font script="Knda" typeface="Tunga"/>
+        <a:font script="Guru" typeface="Raavi"/>
+        <a:font script="Cans" typeface="Euphemia"/>
+        <a:font script="Cher" typeface="Plantagenet Cherokee"/>
+        <a:font script="Yiii" typeface="Microsoft Yi Baiti"/>
+        <a:font script="Tibt" typeface="Microsoft Himalaya"/>
+        <a:font script="Thaa" typeface="MV Boli"/>
+        <a:font script="Deva" typeface="Mangal"/>
+        <a:font script="Telu" typeface="Gautami"/>
+        <a:font script="Taml" typeface="Latha"/>
+        <a:font script="Syrc" typeface="Estrangelo Edessa"/>
+        <a:font script="Orya" typeface="Kalinga"/>
+        <a:font script="Mlym" typeface="Kartika"/>
+        <a:font script="Laoo" typeface="DokChampa"/>
+        <a:font script="Sinh" typeface="Iskoola Pota"/>
+        <a:font script="Mong" typeface="Mongolian Baiti"/>
+        <a:font script="Viet" typeface="Times New Roman"/>
+        <a:font script="Uigh" typeface="Microsoft Uighur"/>
+        <a:font script="Geor" typeface="Sylfaen"/>
+        <a:font script="Armn" typeface="Arial"/>
+        <a:font script="Bugi" typeface="Leelawadee UI"/>
+        <a:font script="Bopo" typeface="Microsoft JhengHei"/>
+        <a:font script="Java" typeface="Javanese Text"/>
+        <a:font script="Lisu" typeface="Segoe UI"/>
+        <a:font script="Mymr" typeface="Myanmar Text"/>
+        <a:font script="Nkoo" typeface="Ebrima"/>
+        <a:font script="Olck" typeface="Nirmala UI"/>
+        <a:font script="Osma" typeface="Ebrima"/>
+        <a:font script="Phag" typeface="Phagspa"/>
+        <a:font script="Syrn" typeface="Estrangelo Edessa"/>
+        <a:font script="Syrj" typeface="Estrangelo Edessa"/>
+        <a:font script="Syre" typeface="Estrangelo Edessa"/>
+        <a:font script="Sora" typeface="Nirmala UI"/>
+        <a:font script="Tale" typeface="Microsoft Tai Le"/>
+        <a:font script="Talu" typeface="Microsoft New Tai Lue"/>
+        <a:font script="Tfng" typeface="Ebrima"/>
+      </a:majorFont>
+      <a:minorFont>
+        <a:latin typeface="Calibri" panose="020F0502020204030204"/>
+        <a:ea typeface=""/>
+        <a:cs typeface=""/>
+        <a:font script="Jpan" typeface="游ゴシック"/>
+        <a:font script="Hang" typeface="맑은 고딕"/>
+        <a:font script="Hans" typeface="等线"/>
+        <a:font script="Hant" typeface="新細明體"/>
+        <a:font script="Arab" typeface="Arial"/>
+        <a:font script="Hebr" typeface="Arial"/>
+        <a:font script="Thai" typeface="Cordia New"/>
+        <a:font script="Ethi" typeface="Nyala"/>
+        <a:font script="Beng" typeface="Vrinda"/>
+        <a:font script="Gujr" typeface="Shruti"/>
+        <a:font script="Khmr" typeface="DaunPenh"/>
+        <a:font script="Knda" typeface="Tunga"/>
+        <a:font script="Guru" typeface="Raavi"/>
+        <a:font script="Cans" typeface="Euphemia"/>
+        <a:font script="Cher" typeface="Plantagenet Cherokee"/>
+        <a:font script="Yiii" typeface="Microsoft Yi Baiti"/>
+        <a:font script="Tibt" typeface="Microsoft Himalaya"/>
+        <a:font script="Thaa" typeface="MV Boli"/>
+        <a:font script="Deva" typeface="Mangal"/>
+        <a:font script="Telu" typeface="Gautami"/>
+        <a:font script="Taml" typeface="Latha"/>
+        <a:font script="Syrc" typeface="Estrangelo Edessa"/>
+        <a:font script="Orya" typeface="Kalinga"/>
+        <a:font script="Mlym" typeface="Kartika"/>
+        <a:font script="Laoo" typeface="DokChampa"/>
+        <a:font script="Sinh" typeface="Iskoola Pota"/>
+        <a:font script="Mong" typeface="Mongolian Baiti"/>
+        <a:font script="Viet" typeface="Arial"/>
+        <a:font script="Uigh" typeface="Microsoft Uighur"/>
+        <a:font script="Geor" typeface="Sylfaen"/>
+        <a:font script="Armn" typeface="Arial"/>
+        <a:font script="Bugi" typeface="Leelawadee UI"/>
+        <a:font script="Bopo" typeface="Microsoft JhengHei"/>
+        <a:font script="Java" typeface="Javanese Text"/>
+        <a:font script="Lisu" typeface="Segoe UI"/>
+        <a:font script="Mymr" typeface="Myanmar Text"/>
+        <a:font script="Nkoo" typeface="Ebrima"/>
+        <a:font script="Olck" typeface="Nirmala UI"/>
+        <a:font script="Osma" typeface="Ebrima"/>
+        <a:font script="Phag" typeface="Phagspa"/>
+        <a:font script="Syrn" typeface="Estrangelo Edessa"/>
+        <a:font script="Syrj" typeface="Estrangelo Edessa"/>
+        <a:font script="Syre" typeface="Estrangelo Edessa"/>
+        <a:font script="Sora" typeface="Nirmala UI"/>
+        <a:font script="Tale" typeface="Microsoft Tai Le"/>
+        <a:font script="Talu" typeface="Microsoft New Tai Lue"/>
+        <a:font script="Tfng" typeface="Ebrima"/>
+      </a:minorFont>
+    </a:fontScheme>
+    <a:fmtScheme name="Office">
+      <a:fillStyleLst>
+        <a:solidFill>
+          <a:schemeClr val="phClr"/>
+        </a:solidFill>
+        <a:gradFill rotWithShape="1">
+          <a:gsLst>
+            <a:gs pos="0">
+              <a:schemeClr val="phClr">
+                <a:lumMod val="110000"/>
+                <a:satMod val="105000"/>
+                <a:tint val="67000"/>
+              </a:schemeClr>
+            </a:gs>
+            <a:gs pos="50000">
+              <a:schemeClr val="phClr">
+                <a:lumMod val="105000"/>
+                <a:satMod val="103000"/>
+                <a:tint val="73000"/>
+              </a:schemeClr>
+            </a:gs>
+            <a:gs pos="100000">
+              <a:schemeClr val="phClr">
+                <a:lumMod val="105000"/>
+                <a:satMod val="109000"/>
+                <a:tint val="81000"/>
+              </a:schemeClr>
+            </a:gs>
+          </a:gsLst>
+          <a:lin ang="5400000" scaled="0"/>
+        </a:gradFill>
+        <a:gradFill rotWithShape="1">
+          <a:gsLst>
+            <a:gs pos="0">
+              <a:schemeClr val="phClr">
+                <a:satMod val="103000"/>
+                <a:lumMod val="102000"/>
+                <a:tint val="94000"/>
+              </a:schemeClr>
+            </a:gs>
+            <a:gs pos="50000">
+              <a:schemeClr val="phClr">
+                <a:satMod val="110000"/>
+                <a:lumMod val="100000"/>
+                <a:shade val="100000"/>
+              </a:schemeClr>
+            </a:gs>
+            <a:gs pos="100000">
+              <a:schemeClr val="phClr">
+                <a:lumMod val="99000"/>
+                <a:satMod val="120000"/>
+                <a:shade val="78000"/>
+              </a:schemeClr>
+            </a:gs>
+          </a:gsLst>
+          <a:lin ang="5400000" scaled="0"/>
+        </a:gradFill>
+      </a:fillStyleLst>
+      <a:lnStyleLst>
+        <a:ln w="6350" cap="flat" cmpd="sng" algn="ctr">
+          <a:solidFill>
+            <a:schemeClr val="phClr"/>
+          </a:solidFill>
+          <a:prstDash val="solid"/>
+          <a:miter lim="800000"/>
+        </a:ln>
+        <a:ln w="12700" cap="flat" cmpd="sng" algn="ctr">
+          <a:solidFill>
+            <a:schemeClr val="phClr"/>
+          </a:solidFill>
+          <a:prstDash val="solid"/>
+          <a:miter lim="800000"/>
+        </a:ln>
+        <a:ln w="19050" cap="flat" cmpd="sng" algn="ctr">
+          <a:solidFill>
+            <a:schemeClr val="phClr"/>
+          </a:solidFill>
+          <a:prstDash val="solid"/>
+          <a:miter lim="800000"/>
+        </a:ln>
+      </a:lnStyleLst>
+      <a:effectStyleLst>
+        <a:effectStyle>
+          <a:effectLst/>
+        </a:effectStyle>
+        <a:effectStyle>
+          <a:effectLst/>
+        </a:effectStyle>
+        <a:effectStyle>
+          <a:effectLst>
+            <a:outerShdw blurRad="57150" dist="19050" dir="5400000" algn="ctr" rotWithShape="0">
+              <a:srgbClr val="000000">
+                <a:alpha val="63000"/>
+              </a:srgbClr>
+            </a:outerShdw>
+          </a:effectLst>
+        </a:effectStyle>
+      </a:effectStyleLst>
+      <a:bgFillStyleLst>
+        <a:solidFill>
+          <a:schemeClr val="phClr"/>
+        </a:solidFill>
+        <a:solidFill>
+          <a:schemeClr val="phClr">
+            <a:tint val="95000"/>
+            <a:satMod val="170000"/>
+          </a:schemeClr>
+        </a:solidFill>
+        <a:gradFill rotWithShape="1">
+          <a:gsLst>
+            <a:gs pos="0">
+              <a:schemeClr val="phClr">
+                <a:tint val="93000"/>
+                <a:satMod val="150000"/>
+                <a:shade val="98000"/>
+                <a:lumMod val="102000"/>
+              </a:schemeClr>
+            </a:gs>
+            <a:gs pos="50000">
+              <a:schemeClr val="phClr">
+                <a:tint val="98000"/>
+                <a:satMod val="130000"/>
+                <a:shade val="90000"/>
+                <a:lumMod val="103000"/>
+              </a:schemeClr>
+            </a:gs>
+            <a:gs pos="100000">
+              <a:schemeClr val="phClr">
+                <a:shade val="63000"/>
+                <a:satMod val="120000"/>
+              </a:schemeClr>
+            </a:gs>
+          </a:gsLst>
+          <a:lin ang="5400000" scaled="0"/>
+        </a:gradFill>
+      </a:bgFillStyleLst>
+    </a:fmtScheme>
+  </a:themeElements>
+  <a:objectDefaults/>
+  <a:extraClrSchemeLst/>
+  <a:extLst>
+    <a:ext uri="{05A4C25C-085E-4340-85A3-A5531E510DB2}">
+      <thm15:themeFamily xmlns:thm15="http://schemas.microsoft.com/office/thememl/2012/main" name="Office Theme" id="{62F939B6-93AF-4DB8-9C6B-D6C7DFDC589F}" vid="{4A3C46E8-61CC-4603-A589-7422A47A8E4A}"/>
+    </a:ext>
+  </a:extLst>
+</a:theme>
 </file>
</xml_diff>

<commit_message>
use ~ and ^ operators
</commit_message>
<xml_diff>
--- a/GitLearning.pptx
+++ b/GitLearning.pptx
@@ -5,7 +5,7 @@
     <p:sldMasterId id="2147483648" r:id="rId1"/>
   </p:sldMasterIdLst>
   <p:notesMasterIdLst>
-    <p:notesMasterId r:id="rId16"/>
+    <p:notesMasterId r:id="rId20"/>
   </p:notesMasterIdLst>
   <p:sldIdLst>
     <p:sldId id="256" r:id="rId2"/>
@@ -22,6 +22,10 @@
     <p:sldId id="267" r:id="rId13"/>
     <p:sldId id="268" r:id="rId14"/>
     <p:sldId id="269" r:id="rId15"/>
+    <p:sldId id="270" r:id="rId16"/>
+    <p:sldId id="271" r:id="rId17"/>
+    <p:sldId id="272" r:id="rId18"/>
+    <p:sldId id="273" r:id="rId19"/>
   </p:sldIdLst>
   <p:sldSz cx="12192000" cy="6858000"/>
   <p:notesSz cx="6858000" cy="9144000"/>
@@ -120,6 +124,11 @@
       </a:defRPr>
     </a:lvl9pPr>
   </p:defaultTextStyle>
+  <p:extLst>
+    <p:ext uri="{EFAFB233-063F-42B5-8137-9DF3F51BA10A}">
+      <p15:sldGuideLst xmlns:p15="http://schemas.microsoft.com/office/powerpoint/2012/main"/>
+    </p:ext>
+  </p:extLst>
 </p:presentation>
 </file>
 
@@ -4809,7 +4818,7 @@
         <p:spPr>
           <a:xfrm>
             <a:off x="8101977" y="5253633"/>
-            <a:ext cx="2606040" cy="923330"/>
+            <a:ext cx="2606040" cy="646331"/>
           </a:xfrm>
           <a:prstGeom prst="rect">
             <a:avLst/>
@@ -4822,21 +4831,23 @@
           </a:bodyPr>
           <a:lstStyle/>
           <a:p>
+            <a:pPr marL="285750" indent="-285750">
+              <a:buFont typeface="Wingdings" panose="05000000000000000000" pitchFamily="2" charset="2"/>
+              <a:buChar char="ü"/>
+            </a:pPr>
             <a:r>
               <a:rPr lang="en-US" dirty="0"/>
-              <a:t>1) git checkout b7b2559</a:t>
-            </a:r>
-          </a:p>
-          <a:p>
+              <a:t>git checkout b7b2559</a:t>
+            </a:r>
+          </a:p>
+          <a:p>
+            <a:pPr marL="285750" indent="-285750">
+              <a:buFont typeface="Wingdings" panose="05000000000000000000" pitchFamily="2" charset="2"/>
+              <a:buChar char="ü"/>
+            </a:pPr>
             <a:r>
               <a:rPr lang="en-US" dirty="0"/>
-              <a:t> </a:t>
-            </a:r>
-          </a:p>
-          <a:p>
-            <a:r>
-              <a:rPr lang="en-US" dirty="0"/>
-              <a:t>2) git checkout HEAD~2</a:t>
+              <a:t> git checkout HEAD~2</a:t>
             </a:r>
           </a:p>
         </p:txBody>
@@ -4956,19 +4967,1069 @@
             <p:ph idx="1"/>
           </p:nvPr>
         </p:nvSpPr>
-        <p:spPr/>
-        <p:txBody>
-          <a:bodyPr/>
-          <a:lstStyle/>
-          <a:p>
-            <a:endParaRPr lang="en-US"/>
-          </a:p>
-        </p:txBody>
-      </p:sp>
+        <p:spPr>
+          <a:xfrm>
+            <a:off x="838200" y="1825625"/>
+            <a:ext cx="7437120" cy="4351338"/>
+          </a:xfrm>
+        </p:spPr>
+        <p:txBody>
+          <a:bodyPr>
+            <a:normAutofit/>
+          </a:bodyPr>
+          <a:lstStyle/>
+          <a:p>
+            <a:pPr marL="0" indent="0" algn="just">
+              <a:buNone/>
+            </a:pPr>
+            <a:r>
+              <a:rPr lang="en-US" sz="2000" dirty="0"/>
+              <a:t>Specifying commits by their hash isn't the most convenient thing ever, which is why Git has </a:t>
+            </a:r>
+            <a:r>
+              <a:rPr lang="en-US" sz="2000" b="1" u="sng" dirty="0"/>
+              <a:t>relative refs</a:t>
+            </a:r>
+            <a:r>
+              <a:rPr lang="en-US" sz="2000" dirty="0"/>
+              <a:t>. With relative refs, you can start somewhere memorable (like the branch </a:t>
+            </a:r>
+            <a:r>
+              <a:rPr lang="en-US" sz="2000" i="1" dirty="0" err="1"/>
+              <a:t>bugFix</a:t>
+            </a:r>
+            <a:r>
+              <a:rPr lang="en-US" sz="2000" dirty="0"/>
+              <a:t> or </a:t>
+            </a:r>
+            <a:r>
+              <a:rPr lang="en-US" sz="2000" i="1" dirty="0"/>
+              <a:t>HEAD</a:t>
+            </a:r>
+            <a:r>
+              <a:rPr lang="en-US" sz="2000" dirty="0"/>
+              <a:t>) and work from there.</a:t>
+            </a:r>
+          </a:p>
+          <a:p>
+            <a:pPr marL="0" indent="0" algn="just">
+              <a:buNone/>
+            </a:pPr>
+            <a:r>
+              <a:rPr lang="en-US" sz="2000" dirty="0"/>
+              <a:t>Relative commits are powerful, but we will introduce two simple ones here:</a:t>
+            </a:r>
+          </a:p>
+          <a:p>
+            <a:pPr algn="just"/>
+            <a:r>
+              <a:rPr lang="en-US" sz="1800" dirty="0"/>
+              <a:t>Moving upwards one commit at a time with </a:t>
+            </a:r>
+            <a:r>
+              <a:rPr lang="en-US" sz="1800" dirty="0">
+                <a:solidFill>
+                  <a:srgbClr val="C00000"/>
+                </a:solidFill>
+              </a:rPr>
+              <a:t>^</a:t>
+            </a:r>
+          </a:p>
+          <a:p>
+            <a:pPr algn="just"/>
+            <a:r>
+              <a:rPr lang="en-US" sz="1800" dirty="0"/>
+              <a:t>Moving upwards a number of times with </a:t>
+            </a:r>
+            <a:r>
+              <a:rPr lang="en-US" sz="1800" dirty="0">
+                <a:solidFill>
+                  <a:srgbClr val="C00000"/>
+                </a:solidFill>
+              </a:rPr>
+              <a:t>~&lt;num&gt;</a:t>
+            </a:r>
+          </a:p>
+          <a:p>
+            <a:pPr marL="0" indent="0" algn="just">
+              <a:buNone/>
+            </a:pPr>
+            <a:endParaRPr lang="en-US" sz="1800" dirty="0">
+              <a:solidFill>
+                <a:srgbClr val="C00000"/>
+              </a:solidFill>
+            </a:endParaRPr>
+          </a:p>
+          <a:p>
+            <a:pPr marL="0" indent="0" algn="just">
+              <a:buNone/>
+            </a:pPr>
+            <a:r>
+              <a:rPr lang="en-US" sz="2000" dirty="0">
+                <a:solidFill>
+                  <a:schemeClr val="tx1">
+                    <a:lumMod val="75000"/>
+                    <a:lumOff val="25000"/>
+                  </a:schemeClr>
+                </a:solidFill>
+              </a:rPr>
+              <a:t>&gt; git checkout main^ </a:t>
+            </a:r>
+          </a:p>
+          <a:p>
+            <a:pPr marL="0" indent="0" algn="just">
+              <a:buNone/>
+            </a:pPr>
+            <a:r>
+              <a:rPr lang="en-US" sz="2000" dirty="0"/>
+              <a:t>So saying main^ is equivalent to "the first parent of main".</a:t>
+            </a:r>
+          </a:p>
+          <a:p>
+            <a:pPr marL="0" indent="0" algn="just">
+              <a:buNone/>
+            </a:pPr>
+            <a:r>
+              <a:rPr lang="en-US" sz="2000" dirty="0"/>
+              <a:t>main^^ is the grandparent (second-generation ancestor) of main.</a:t>
+            </a:r>
+          </a:p>
+        </p:txBody>
+      </p:sp>
+      <p:pic>
+        <p:nvPicPr>
+          <p:cNvPr id="8" name="Picture 7">
+            <a:extLst>
+              <a:ext uri="{FF2B5EF4-FFF2-40B4-BE49-F238E27FC236}">
+                <a16:creationId xmlns:a16="http://schemas.microsoft.com/office/drawing/2014/main" id="{121088BE-F52B-2FFA-4845-3CEB99E41BA5}"/>
+              </a:ext>
+            </a:extLst>
+          </p:cNvPr>
+          <p:cNvPicPr>
+            <a:picLocks noChangeAspect="1"/>
+          </p:cNvPicPr>
+          <p:nvPr/>
+        </p:nvPicPr>
+        <p:blipFill>
+          <a:blip r:embed="rId2">
+            <a:extLst>
+              <a:ext uri="{28A0092B-C50C-407E-A947-70E740481C1C}">
+                <a14:useLocalDpi xmlns:a14="http://schemas.microsoft.com/office/drawing/2010/main" val="0"/>
+              </a:ext>
+            </a:extLst>
+          </a:blip>
+          <a:stretch>
+            <a:fillRect/>
+          </a:stretch>
+        </p:blipFill>
+        <p:spPr>
+          <a:xfrm>
+            <a:off x="8833256" y="590772"/>
+            <a:ext cx="2889352" cy="2737644"/>
+          </a:xfrm>
+          <a:prstGeom prst="rect">
+            <a:avLst/>
+          </a:prstGeom>
+        </p:spPr>
+      </p:pic>
+      <p:pic>
+        <p:nvPicPr>
+          <p:cNvPr id="14" name="Picture 13">
+            <a:extLst>
+              <a:ext uri="{FF2B5EF4-FFF2-40B4-BE49-F238E27FC236}">
+                <a16:creationId xmlns:a16="http://schemas.microsoft.com/office/drawing/2014/main" id="{3328E7EA-ECC4-80D4-5F51-1487E7090239}"/>
+              </a:ext>
+            </a:extLst>
+          </p:cNvPr>
+          <p:cNvPicPr>
+            <a:picLocks noChangeAspect="1"/>
+          </p:cNvPicPr>
+          <p:nvPr/>
+        </p:nvPicPr>
+        <p:blipFill>
+          <a:blip r:embed="rId3">
+            <a:extLst>
+              <a:ext uri="{28A0092B-C50C-407E-A947-70E740481C1C}">
+                <a14:useLocalDpi xmlns:a14="http://schemas.microsoft.com/office/drawing/2010/main" val="0"/>
+              </a:ext>
+            </a:extLst>
+          </a:blip>
+          <a:stretch>
+            <a:fillRect/>
+          </a:stretch>
+        </p:blipFill>
+        <p:spPr>
+          <a:xfrm>
+            <a:off x="8833257" y="3554062"/>
+            <a:ext cx="2889352" cy="3086175"/>
+          </a:xfrm>
+          <a:prstGeom prst="rect">
+            <a:avLst/>
+          </a:prstGeom>
+        </p:spPr>
+      </p:pic>
     </p:spTree>
     <p:extLst>
       <p:ext uri="{BB962C8B-B14F-4D97-AF65-F5344CB8AC3E}">
         <p14:creationId xmlns:p14="http://schemas.microsoft.com/office/powerpoint/2010/main" val="1568203340"/>
+      </p:ext>
+    </p:extLst>
+  </p:cSld>
+  <p:clrMapOvr>
+    <a:masterClrMapping/>
+  </p:clrMapOvr>
+</p:sld>
+</file>
+
+<file path=ppt/slides/slide15.xml><?xml version="1.0" encoding="utf-8"?>
+<p:sld xmlns:a="http://schemas.openxmlformats.org/drawingml/2006/main" xmlns:r="http://schemas.openxmlformats.org/officeDocument/2006/relationships" xmlns:p="http://schemas.openxmlformats.org/presentationml/2006/main">
+  <p:cSld>
+    <p:spTree>
+      <p:nvGrpSpPr>
+        <p:cNvPr id="1" name=""/>
+        <p:cNvGrpSpPr/>
+        <p:nvPr/>
+      </p:nvGrpSpPr>
+      <p:grpSpPr>
+        <a:xfrm>
+          <a:off x="0" y="0"/>
+          <a:ext cx="0" cy="0"/>
+          <a:chOff x="0" y="0"/>
+          <a:chExt cx="0" cy="0"/>
+        </a:xfrm>
+      </p:grpSpPr>
+      <p:sp>
+        <p:nvSpPr>
+          <p:cNvPr id="2" name="Title 1">
+            <a:extLst>
+              <a:ext uri="{FF2B5EF4-FFF2-40B4-BE49-F238E27FC236}">
+                <a16:creationId xmlns:a16="http://schemas.microsoft.com/office/drawing/2014/main" id="{C2CFD9E6-1256-12BD-0D78-2A5C6291D745}"/>
+              </a:ext>
+            </a:extLst>
+          </p:cNvPr>
+          <p:cNvSpPr>
+            <a:spLocks noGrp="1"/>
+          </p:cNvSpPr>
+          <p:nvPr>
+            <p:ph type="title"/>
+          </p:nvPr>
+        </p:nvSpPr>
+        <p:spPr/>
+        <p:txBody>
+          <a:bodyPr/>
+          <a:lstStyle/>
+          <a:p>
+            <a:r>
+              <a:rPr lang="en-US" dirty="0"/>
+              <a:t>Relative Refs</a:t>
+            </a:r>
+          </a:p>
+        </p:txBody>
+      </p:sp>
+      <p:sp>
+        <p:nvSpPr>
+          <p:cNvPr id="3" name="Content Placeholder 2">
+            <a:extLst>
+              <a:ext uri="{FF2B5EF4-FFF2-40B4-BE49-F238E27FC236}">
+                <a16:creationId xmlns:a16="http://schemas.microsoft.com/office/drawing/2014/main" id="{AA59D1BF-6B20-039E-6740-86730A245311}"/>
+              </a:ext>
+            </a:extLst>
+          </p:cNvPr>
+          <p:cNvSpPr>
+            <a:spLocks noGrp="1"/>
+          </p:cNvSpPr>
+          <p:nvPr>
+            <p:ph idx="1"/>
+          </p:nvPr>
+        </p:nvSpPr>
+        <p:spPr>
+          <a:xfrm>
+            <a:off x="838200" y="1825625"/>
+            <a:ext cx="7263384" cy="4351338"/>
+          </a:xfrm>
+        </p:spPr>
+        <p:txBody>
+          <a:bodyPr/>
+          <a:lstStyle/>
+          <a:p>
+            <a:pPr marL="0" indent="0" algn="just">
+              <a:buNone/>
+            </a:pPr>
+            <a:r>
+              <a:rPr lang="en-US" sz="2800" dirty="0"/>
+              <a:t>You can also reference HEAD as a relative ref. </a:t>
+            </a:r>
+          </a:p>
+          <a:p>
+            <a:pPr marL="0" indent="0" algn="just">
+              <a:buNone/>
+            </a:pPr>
+            <a:r>
+              <a:rPr lang="en-US" sz="2800" dirty="0"/>
+              <a:t>We can travel backwards in time with HEAD^.</a:t>
+            </a:r>
+          </a:p>
+          <a:p>
+            <a:pPr marL="0" indent="0" algn="just">
+              <a:buNone/>
+            </a:pPr>
+            <a:endParaRPr lang="en-US" sz="2800" dirty="0"/>
+          </a:p>
+          <a:p>
+            <a:pPr marL="0" indent="0" algn="just">
+              <a:buNone/>
+            </a:pPr>
+            <a:r>
+              <a:rPr lang="en-US" sz="2000" dirty="0">
+                <a:solidFill>
+                  <a:schemeClr val="tx1">
+                    <a:lumMod val="75000"/>
+                    <a:lumOff val="25000"/>
+                  </a:schemeClr>
+                </a:solidFill>
+              </a:rPr>
+              <a:t>&gt; git checkout C3</a:t>
+            </a:r>
+          </a:p>
+          <a:p>
+            <a:pPr marL="0" indent="0" algn="just">
+              <a:buNone/>
+            </a:pPr>
+            <a:r>
+              <a:rPr lang="en-US" sz="2000" dirty="0">
+                <a:solidFill>
+                  <a:schemeClr val="tx1">
+                    <a:lumMod val="75000"/>
+                    <a:lumOff val="25000"/>
+                  </a:schemeClr>
+                </a:solidFill>
+              </a:rPr>
+              <a:t>&gt; git checkout HEAD^</a:t>
+            </a:r>
+          </a:p>
+          <a:p>
+            <a:pPr marL="0" indent="0" algn="just">
+              <a:buNone/>
+            </a:pPr>
+            <a:r>
+              <a:rPr lang="en-US" sz="2000" dirty="0">
+                <a:solidFill>
+                  <a:schemeClr val="tx1">
+                    <a:lumMod val="75000"/>
+                    <a:lumOff val="25000"/>
+                  </a:schemeClr>
+                </a:solidFill>
+              </a:rPr>
+              <a:t>&gt; git checkout HEAD^</a:t>
+            </a:r>
+          </a:p>
+          <a:p>
+            <a:pPr marL="0" indent="0" algn="just">
+              <a:buNone/>
+            </a:pPr>
+            <a:r>
+              <a:rPr lang="en-US" sz="2000" dirty="0">
+                <a:solidFill>
+                  <a:schemeClr val="tx1">
+                    <a:lumMod val="75000"/>
+                    <a:lumOff val="25000"/>
+                  </a:schemeClr>
+                </a:solidFill>
+              </a:rPr>
+              <a:t>&gt; git checkout HEAD^</a:t>
+            </a:r>
+          </a:p>
+          <a:p>
+            <a:endParaRPr lang="en-US" dirty="0"/>
+          </a:p>
+        </p:txBody>
+      </p:sp>
+      <p:pic>
+        <p:nvPicPr>
+          <p:cNvPr id="5" name="Picture 4">
+            <a:extLst>
+              <a:ext uri="{FF2B5EF4-FFF2-40B4-BE49-F238E27FC236}">
+                <a16:creationId xmlns:a16="http://schemas.microsoft.com/office/drawing/2014/main" id="{85DE2793-950E-10A2-2266-C12F9AB87E67}"/>
+              </a:ext>
+            </a:extLst>
+          </p:cNvPr>
+          <p:cNvPicPr>
+            <a:picLocks noChangeAspect="1"/>
+          </p:cNvPicPr>
+          <p:nvPr/>
+        </p:nvPicPr>
+        <p:blipFill>
+          <a:blip r:embed="rId2">
+            <a:extLst>
+              <a:ext uri="{28A0092B-C50C-407E-A947-70E740481C1C}">
+                <a14:useLocalDpi xmlns:a14="http://schemas.microsoft.com/office/drawing/2010/main" val="0"/>
+              </a:ext>
+            </a:extLst>
+          </a:blip>
+          <a:stretch>
+            <a:fillRect/>
+          </a:stretch>
+        </p:blipFill>
+        <p:spPr>
+          <a:xfrm>
+            <a:off x="8631936" y="3538064"/>
+            <a:ext cx="3160776" cy="2954811"/>
+          </a:xfrm>
+          <a:prstGeom prst="rect">
+            <a:avLst/>
+          </a:prstGeom>
+        </p:spPr>
+      </p:pic>
+      <p:pic>
+        <p:nvPicPr>
+          <p:cNvPr id="7" name="Picture 6">
+            <a:extLst>
+              <a:ext uri="{FF2B5EF4-FFF2-40B4-BE49-F238E27FC236}">
+                <a16:creationId xmlns:a16="http://schemas.microsoft.com/office/drawing/2014/main" id="{AFF4D6D0-FE0E-C62E-FAB4-49D20E5CA94A}"/>
+              </a:ext>
+            </a:extLst>
+          </p:cNvPr>
+          <p:cNvPicPr>
+            <a:picLocks noChangeAspect="1"/>
+          </p:cNvPicPr>
+          <p:nvPr/>
+        </p:nvPicPr>
+        <p:blipFill>
+          <a:blip r:embed="rId3">
+            <a:extLst>
+              <a:ext uri="{28A0092B-C50C-407E-A947-70E740481C1C}">
+                <a14:useLocalDpi xmlns:a14="http://schemas.microsoft.com/office/drawing/2010/main" val="0"/>
+              </a:ext>
+            </a:extLst>
+          </a:blip>
+          <a:stretch>
+            <a:fillRect/>
+          </a:stretch>
+        </p:blipFill>
+        <p:spPr>
+          <a:xfrm>
+            <a:off x="8631936" y="520159"/>
+            <a:ext cx="3160776" cy="2994817"/>
+          </a:xfrm>
+          <a:prstGeom prst="rect">
+            <a:avLst/>
+          </a:prstGeom>
+        </p:spPr>
+      </p:pic>
+    </p:spTree>
+    <p:extLst>
+      <p:ext uri="{BB962C8B-B14F-4D97-AF65-F5344CB8AC3E}">
+        <p14:creationId xmlns:p14="http://schemas.microsoft.com/office/powerpoint/2010/main" val="2479079188"/>
+      </p:ext>
+    </p:extLst>
+  </p:cSld>
+  <p:clrMapOvr>
+    <a:masterClrMapping/>
+  </p:clrMapOvr>
+</p:sld>
+</file>
+
+<file path=ppt/slides/slide16.xml><?xml version="1.0" encoding="utf-8"?>
+<p:sld xmlns:a="http://schemas.openxmlformats.org/drawingml/2006/main" xmlns:r="http://schemas.openxmlformats.org/officeDocument/2006/relationships" xmlns:p="http://schemas.openxmlformats.org/presentationml/2006/main">
+  <p:cSld>
+    <p:spTree>
+      <p:nvGrpSpPr>
+        <p:cNvPr id="1" name=""/>
+        <p:cNvGrpSpPr/>
+        <p:nvPr/>
+      </p:nvGrpSpPr>
+      <p:grpSpPr>
+        <a:xfrm>
+          <a:off x="0" y="0"/>
+          <a:ext cx="0" cy="0"/>
+          <a:chOff x="0" y="0"/>
+          <a:chExt cx="0" cy="0"/>
+        </a:xfrm>
+      </p:grpSpPr>
+      <p:sp>
+        <p:nvSpPr>
+          <p:cNvPr id="2" name="Title 1">
+            <a:extLst>
+              <a:ext uri="{FF2B5EF4-FFF2-40B4-BE49-F238E27FC236}">
+                <a16:creationId xmlns:a16="http://schemas.microsoft.com/office/drawing/2014/main" id="{BA785CA4-5EA7-DE4B-6AB9-C303D78B1A94}"/>
+              </a:ext>
+            </a:extLst>
+          </p:cNvPr>
+          <p:cNvSpPr>
+            <a:spLocks noGrp="1"/>
+          </p:cNvSpPr>
+          <p:nvPr>
+            <p:ph type="title"/>
+          </p:nvPr>
+        </p:nvSpPr>
+        <p:spPr/>
+        <p:txBody>
+          <a:bodyPr/>
+          <a:lstStyle/>
+          <a:p>
+            <a:r>
+              <a:rPr lang="en-US" dirty="0"/>
+              <a:t>The "~" operator</a:t>
+            </a:r>
+          </a:p>
+        </p:txBody>
+      </p:sp>
+      <p:sp>
+        <p:nvSpPr>
+          <p:cNvPr id="3" name="Content Placeholder 2">
+            <a:extLst>
+              <a:ext uri="{FF2B5EF4-FFF2-40B4-BE49-F238E27FC236}">
+                <a16:creationId xmlns:a16="http://schemas.microsoft.com/office/drawing/2014/main" id="{AC486FC8-6CB8-8EA3-B829-38FE7E00B92D}"/>
+              </a:ext>
+            </a:extLst>
+          </p:cNvPr>
+          <p:cNvSpPr>
+            <a:spLocks noGrp="1"/>
+          </p:cNvSpPr>
+          <p:nvPr>
+            <p:ph idx="1"/>
+          </p:nvPr>
+        </p:nvSpPr>
+        <p:spPr>
+          <a:xfrm>
+            <a:off x="838200" y="1825625"/>
+            <a:ext cx="7391400" cy="4351338"/>
+          </a:xfrm>
+        </p:spPr>
+        <p:txBody>
+          <a:bodyPr/>
+          <a:lstStyle/>
+          <a:p>
+            <a:pPr marL="0" indent="0">
+              <a:buNone/>
+            </a:pPr>
+            <a:r>
+              <a:rPr lang="en-US" dirty="0"/>
+              <a:t>Say you want to move a lot of levels up in the commit tree. It might be tedious to type ^ several times, so Git also has the tilde (~) operator.</a:t>
+            </a:r>
+          </a:p>
+          <a:p>
+            <a:pPr marL="0" indent="0">
+              <a:buNone/>
+            </a:pPr>
+            <a:endParaRPr lang="en-US" dirty="0"/>
+          </a:p>
+          <a:p>
+            <a:pPr marL="0" indent="0">
+              <a:buNone/>
+            </a:pPr>
+            <a:r>
+              <a:rPr lang="en-US" dirty="0">
+                <a:solidFill>
+                  <a:schemeClr val="tx1">
+                    <a:lumMod val="75000"/>
+                    <a:lumOff val="25000"/>
+                  </a:schemeClr>
+                </a:solidFill>
+              </a:rPr>
+              <a:t>&gt; git checkout HEAD~4</a:t>
+            </a:r>
+          </a:p>
+        </p:txBody>
+      </p:sp>
+      <p:pic>
+        <p:nvPicPr>
+          <p:cNvPr id="7" name="Picture 6">
+            <a:extLst>
+              <a:ext uri="{FF2B5EF4-FFF2-40B4-BE49-F238E27FC236}">
+                <a16:creationId xmlns:a16="http://schemas.microsoft.com/office/drawing/2014/main" id="{60D9CA98-2D91-B5C1-35AB-1BCFD8084120}"/>
+              </a:ext>
+            </a:extLst>
+          </p:cNvPr>
+          <p:cNvPicPr>
+            <a:picLocks noChangeAspect="1"/>
+          </p:cNvPicPr>
+          <p:nvPr/>
+        </p:nvPicPr>
+        <p:blipFill>
+          <a:blip r:embed="rId2">
+            <a:extLst>
+              <a:ext uri="{28A0092B-C50C-407E-A947-70E740481C1C}">
+                <a14:useLocalDpi xmlns:a14="http://schemas.microsoft.com/office/drawing/2010/main" val="0"/>
+              </a:ext>
+            </a:extLst>
+          </a:blip>
+          <a:stretch>
+            <a:fillRect/>
+          </a:stretch>
+        </p:blipFill>
+        <p:spPr>
+          <a:xfrm>
+            <a:off x="8842247" y="655605"/>
+            <a:ext cx="3080647" cy="2838261"/>
+          </a:xfrm>
+          <a:prstGeom prst="rect">
+            <a:avLst/>
+          </a:prstGeom>
+        </p:spPr>
+      </p:pic>
+      <p:pic>
+        <p:nvPicPr>
+          <p:cNvPr id="9" name="Picture 8">
+            <a:extLst>
+              <a:ext uri="{FF2B5EF4-FFF2-40B4-BE49-F238E27FC236}">
+                <a16:creationId xmlns:a16="http://schemas.microsoft.com/office/drawing/2014/main" id="{B233DD29-8418-3A2C-D168-2E9F5ECD0E0B}"/>
+              </a:ext>
+            </a:extLst>
+          </p:cNvPr>
+          <p:cNvPicPr>
+            <a:picLocks noChangeAspect="1"/>
+          </p:cNvPicPr>
+          <p:nvPr/>
+        </p:nvPicPr>
+        <p:blipFill>
+          <a:blip r:embed="rId3">
+            <a:extLst>
+              <a:ext uri="{28A0092B-C50C-407E-A947-70E740481C1C}">
+                <a14:useLocalDpi xmlns:a14="http://schemas.microsoft.com/office/drawing/2010/main" val="0"/>
+              </a:ext>
+            </a:extLst>
+          </a:blip>
+          <a:stretch>
+            <a:fillRect/>
+          </a:stretch>
+        </p:blipFill>
+        <p:spPr>
+          <a:xfrm>
+            <a:off x="8842247" y="3603771"/>
+            <a:ext cx="3080647" cy="2889104"/>
+          </a:xfrm>
+          <a:prstGeom prst="rect">
+            <a:avLst/>
+          </a:prstGeom>
+        </p:spPr>
+      </p:pic>
+    </p:spTree>
+    <p:extLst>
+      <p:ext uri="{BB962C8B-B14F-4D97-AF65-F5344CB8AC3E}">
+        <p14:creationId xmlns:p14="http://schemas.microsoft.com/office/powerpoint/2010/main" val="2410219204"/>
+      </p:ext>
+    </p:extLst>
+  </p:cSld>
+  <p:clrMapOvr>
+    <a:masterClrMapping/>
+  </p:clrMapOvr>
+</p:sld>
+</file>
+
+<file path=ppt/slides/slide17.xml><?xml version="1.0" encoding="utf-8"?>
+<p:sld xmlns:a="http://schemas.openxmlformats.org/drawingml/2006/main" xmlns:r="http://schemas.openxmlformats.org/officeDocument/2006/relationships" xmlns:p="http://schemas.openxmlformats.org/presentationml/2006/main">
+  <p:cSld>
+    <p:spTree>
+      <p:nvGrpSpPr>
+        <p:cNvPr id="1" name=""/>
+        <p:cNvGrpSpPr/>
+        <p:nvPr/>
+      </p:nvGrpSpPr>
+      <p:grpSpPr>
+        <a:xfrm>
+          <a:off x="0" y="0"/>
+          <a:ext cx="0" cy="0"/>
+          <a:chOff x="0" y="0"/>
+          <a:chExt cx="0" cy="0"/>
+        </a:xfrm>
+      </p:grpSpPr>
+      <p:sp>
+        <p:nvSpPr>
+          <p:cNvPr id="2" name="Title 1">
+            <a:extLst>
+              <a:ext uri="{FF2B5EF4-FFF2-40B4-BE49-F238E27FC236}">
+                <a16:creationId xmlns:a16="http://schemas.microsoft.com/office/drawing/2014/main" id="{D6F2220B-D842-7D83-5EC5-AA5AA3E83640}"/>
+              </a:ext>
+            </a:extLst>
+          </p:cNvPr>
+          <p:cNvSpPr>
+            <a:spLocks noGrp="1"/>
+          </p:cNvSpPr>
+          <p:nvPr>
+            <p:ph type="title"/>
+          </p:nvPr>
+        </p:nvSpPr>
+        <p:spPr/>
+        <p:txBody>
+          <a:bodyPr/>
+          <a:lstStyle/>
+          <a:p>
+            <a:r>
+              <a:rPr lang="en-US" dirty="0"/>
+              <a:t>Branch Forcing</a:t>
+            </a:r>
+          </a:p>
+        </p:txBody>
+      </p:sp>
+      <p:sp>
+        <p:nvSpPr>
+          <p:cNvPr id="3" name="Content Placeholder 2">
+            <a:extLst>
+              <a:ext uri="{FF2B5EF4-FFF2-40B4-BE49-F238E27FC236}">
+                <a16:creationId xmlns:a16="http://schemas.microsoft.com/office/drawing/2014/main" id="{25FF58B3-B73D-8BA3-5251-C3FA85614708}"/>
+              </a:ext>
+            </a:extLst>
+          </p:cNvPr>
+          <p:cNvSpPr>
+            <a:spLocks noGrp="1"/>
+          </p:cNvSpPr>
+          <p:nvPr>
+            <p:ph idx="1"/>
+          </p:nvPr>
+        </p:nvSpPr>
+        <p:spPr>
+          <a:xfrm>
+            <a:off x="838200" y="1825625"/>
+            <a:ext cx="7784592" cy="4351338"/>
+          </a:xfrm>
+        </p:spPr>
+        <p:txBody>
+          <a:bodyPr>
+            <a:normAutofit fontScale="92500" lnSpcReduction="20000"/>
+          </a:bodyPr>
+          <a:lstStyle/>
+          <a:p>
+            <a:pPr marL="0" indent="0">
+              <a:buNone/>
+            </a:pPr>
+            <a:r>
+              <a:rPr lang="en-US" sz="2400" dirty="0"/>
+              <a:t>One of the most common ways I use relative refs is to move branches around. </a:t>
+            </a:r>
+          </a:p>
+          <a:p>
+            <a:pPr marL="0" indent="0">
+              <a:buNone/>
+            </a:pPr>
+            <a:r>
+              <a:rPr lang="en-US" sz="2200" dirty="0"/>
+              <a:t>You can directly reassign a branch to a commit with the </a:t>
+            </a:r>
+            <a:r>
+              <a:rPr lang="en-US" sz="2200" b="1" dirty="0">
+                <a:solidFill>
+                  <a:srgbClr val="C00000"/>
+                </a:solidFill>
+              </a:rPr>
+              <a:t>-f </a:t>
+            </a:r>
+            <a:r>
+              <a:rPr lang="en-US" sz="2200" dirty="0"/>
+              <a:t>option. </a:t>
+            </a:r>
+          </a:p>
+          <a:p>
+            <a:pPr marL="0" indent="0">
+              <a:buNone/>
+            </a:pPr>
+            <a:r>
+              <a:rPr lang="en-US" sz="2200" dirty="0"/>
+              <a:t>So something like:</a:t>
+            </a:r>
+          </a:p>
+          <a:p>
+            <a:pPr marL="0" indent="0">
+              <a:buNone/>
+            </a:pPr>
+            <a:endParaRPr lang="en-US" sz="2000" dirty="0"/>
+          </a:p>
+          <a:p>
+            <a:pPr marL="0" indent="0">
+              <a:buNone/>
+            </a:pPr>
+            <a:r>
+              <a:rPr lang="en-US" sz="2000" dirty="0">
+                <a:solidFill>
+                  <a:schemeClr val="tx1">
+                    <a:lumMod val="75000"/>
+                    <a:lumOff val="25000"/>
+                  </a:schemeClr>
+                </a:solidFill>
+              </a:rPr>
+              <a:t>&gt; git branch -f main HEAD~3</a:t>
+            </a:r>
+          </a:p>
+          <a:p>
+            <a:pPr marL="0" indent="0">
+              <a:buNone/>
+            </a:pPr>
+            <a:r>
+              <a:rPr lang="en-US" sz="2000" dirty="0">
+                <a:solidFill>
+                  <a:schemeClr val="tx1">
+                    <a:lumMod val="65000"/>
+                    <a:lumOff val="35000"/>
+                  </a:schemeClr>
+                </a:solidFill>
+              </a:rPr>
+              <a:t>Relative refs gave us a concise way to refer to C1 and branch forcing (-f) gave us a way to </a:t>
+            </a:r>
+            <a:r>
+              <a:rPr lang="en-US" sz="2000" u="sng" dirty="0">
+                <a:solidFill>
+                  <a:schemeClr val="tx1">
+                    <a:lumMod val="65000"/>
+                    <a:lumOff val="35000"/>
+                  </a:schemeClr>
+                </a:solidFill>
+              </a:rPr>
+              <a:t>quickly move a branch to that location</a:t>
+            </a:r>
+            <a:r>
+              <a:rPr lang="en-US" sz="2000" dirty="0">
+                <a:solidFill>
+                  <a:schemeClr val="tx1">
+                    <a:lumMod val="65000"/>
+                    <a:lumOff val="35000"/>
+                  </a:schemeClr>
+                </a:solidFill>
+              </a:rPr>
+              <a:t>.</a:t>
+            </a:r>
+          </a:p>
+          <a:p>
+            <a:pPr>
+              <a:buFont typeface="Wingdings" panose="05000000000000000000" pitchFamily="2" charset="2"/>
+              <a:buChar char="Ø"/>
+            </a:pPr>
+            <a:endParaRPr lang="en-US" sz="2400" b="1" i="1" dirty="0">
+              <a:solidFill>
+                <a:schemeClr val="tx1">
+                  <a:lumMod val="75000"/>
+                  <a:lumOff val="25000"/>
+                </a:schemeClr>
+              </a:solidFill>
+            </a:endParaRPr>
+          </a:p>
+          <a:p>
+            <a:pPr marL="0" indent="0">
+              <a:buNone/>
+            </a:pPr>
+            <a:endParaRPr lang="en-US" sz="2400" b="1" i="1" dirty="0">
+              <a:solidFill>
+                <a:srgbClr val="C00000"/>
+              </a:solidFill>
+            </a:endParaRPr>
+          </a:p>
+          <a:p>
+            <a:pPr marL="0" indent="0">
+              <a:buNone/>
+            </a:pPr>
+            <a:endParaRPr lang="en-US" sz="2400" b="1" i="1" dirty="0">
+              <a:solidFill>
+                <a:srgbClr val="C00000"/>
+              </a:solidFill>
+            </a:endParaRPr>
+          </a:p>
+          <a:p>
+            <a:pPr marL="0" indent="0">
+              <a:buNone/>
+            </a:pPr>
+            <a:r>
+              <a:rPr lang="en-US" sz="2200" b="1" i="1" dirty="0">
+                <a:solidFill>
+                  <a:srgbClr val="C00000"/>
+                </a:solidFill>
+              </a:rPr>
+              <a:t>Note: </a:t>
+            </a:r>
+            <a:r>
+              <a:rPr lang="en-US" sz="2200" i="1" dirty="0">
+                <a:solidFill>
+                  <a:schemeClr val="tx1">
+                    <a:lumMod val="65000"/>
+                    <a:lumOff val="35000"/>
+                  </a:schemeClr>
+                </a:solidFill>
+              </a:rPr>
+              <a:t>In a real git environment git branch -f command is not allowed for your current branch.</a:t>
+            </a:r>
+          </a:p>
+          <a:p>
+            <a:pPr marL="0" indent="0">
+              <a:buNone/>
+            </a:pPr>
+            <a:endParaRPr lang="en-US" sz="2400" dirty="0">
+              <a:solidFill>
+                <a:schemeClr val="tx1">
+                  <a:lumMod val="75000"/>
+                  <a:lumOff val="25000"/>
+                </a:schemeClr>
+              </a:solidFill>
+            </a:endParaRPr>
+          </a:p>
+          <a:p>
+            <a:pPr marL="0" indent="0">
+              <a:buNone/>
+            </a:pPr>
+            <a:endParaRPr lang="en-US" dirty="0"/>
+          </a:p>
+        </p:txBody>
+      </p:sp>
+      <p:pic>
+        <p:nvPicPr>
+          <p:cNvPr id="6" name="Picture 5">
+            <a:extLst>
+              <a:ext uri="{FF2B5EF4-FFF2-40B4-BE49-F238E27FC236}">
+                <a16:creationId xmlns:a16="http://schemas.microsoft.com/office/drawing/2014/main" id="{2B277DE6-3FDD-42C3-3DA1-4BA4728E04A0}"/>
+              </a:ext>
+            </a:extLst>
+          </p:cNvPr>
+          <p:cNvPicPr>
+            <a:picLocks noChangeAspect="1"/>
+          </p:cNvPicPr>
+          <p:nvPr/>
+        </p:nvPicPr>
+        <p:blipFill>
+          <a:blip r:embed="rId2">
+            <a:extLst>
+              <a:ext uri="{28A0092B-C50C-407E-A947-70E740481C1C}">
+                <a14:useLocalDpi xmlns:a14="http://schemas.microsoft.com/office/drawing/2010/main" val="0"/>
+              </a:ext>
+            </a:extLst>
+          </a:blip>
+          <a:stretch>
+            <a:fillRect/>
+          </a:stretch>
+        </p:blipFill>
+        <p:spPr>
+          <a:xfrm>
+            <a:off x="8780076" y="365125"/>
+            <a:ext cx="3125412" cy="2951779"/>
+          </a:xfrm>
+          <a:prstGeom prst="rect">
+            <a:avLst/>
+          </a:prstGeom>
+        </p:spPr>
+      </p:pic>
+      <p:pic>
+        <p:nvPicPr>
+          <p:cNvPr id="8" name="Picture 7">
+            <a:extLst>
+              <a:ext uri="{FF2B5EF4-FFF2-40B4-BE49-F238E27FC236}">
+                <a16:creationId xmlns:a16="http://schemas.microsoft.com/office/drawing/2014/main" id="{50DDFC8A-B9DC-23B8-3D27-6A6FC0171AC3}"/>
+              </a:ext>
+            </a:extLst>
+          </p:cNvPr>
+          <p:cNvPicPr>
+            <a:picLocks noChangeAspect="1"/>
+          </p:cNvPicPr>
+          <p:nvPr/>
+        </p:nvPicPr>
+        <p:blipFill>
+          <a:blip r:embed="rId3">
+            <a:extLst>
+              <a:ext uri="{28A0092B-C50C-407E-A947-70E740481C1C}">
+                <a14:useLocalDpi xmlns:a14="http://schemas.microsoft.com/office/drawing/2010/main" val="0"/>
+              </a:ext>
+            </a:extLst>
+          </a:blip>
+          <a:stretch>
+            <a:fillRect/>
+          </a:stretch>
+        </p:blipFill>
+        <p:spPr>
+          <a:xfrm>
+            <a:off x="8780076" y="3429000"/>
+            <a:ext cx="3129373" cy="3253133"/>
+          </a:xfrm>
+          <a:prstGeom prst="rect">
+            <a:avLst/>
+          </a:prstGeom>
+        </p:spPr>
+      </p:pic>
+    </p:spTree>
+    <p:extLst>
+      <p:ext uri="{BB962C8B-B14F-4D97-AF65-F5344CB8AC3E}">
+        <p14:creationId xmlns:p14="http://schemas.microsoft.com/office/powerpoint/2010/main" val="3317124997"/>
+      </p:ext>
+    </p:extLst>
+  </p:cSld>
+  <p:clrMapOvr>
+    <a:masterClrMapping/>
+  </p:clrMapOvr>
+</p:sld>
+</file>
+
+<file path=ppt/slides/slide18.xml><?xml version="1.0" encoding="utf-8"?>
+<p:sld xmlns:a="http://schemas.openxmlformats.org/drawingml/2006/main" xmlns:r="http://schemas.openxmlformats.org/officeDocument/2006/relationships" xmlns:p="http://schemas.openxmlformats.org/presentationml/2006/main">
+  <p:cSld>
+    <p:spTree>
+      <p:nvGrpSpPr>
+        <p:cNvPr id="1" name=""/>
+        <p:cNvGrpSpPr/>
+        <p:nvPr/>
+      </p:nvGrpSpPr>
+      <p:grpSpPr>
+        <a:xfrm>
+          <a:off x="0" y="0"/>
+          <a:ext cx="0" cy="0"/>
+          <a:chOff x="0" y="0"/>
+          <a:chExt cx="0" cy="0"/>
+        </a:xfrm>
+      </p:grpSpPr>
+      <p:sp>
+        <p:nvSpPr>
+          <p:cNvPr id="2" name="Title 1">
+            <a:extLst>
+              <a:ext uri="{FF2B5EF4-FFF2-40B4-BE49-F238E27FC236}">
+                <a16:creationId xmlns:a16="http://schemas.microsoft.com/office/drawing/2014/main" id="{64F145F8-F8AB-4FC2-55FA-70DD32D2E226}"/>
+              </a:ext>
+            </a:extLst>
+          </p:cNvPr>
+          <p:cNvSpPr>
+            <a:spLocks noGrp="1"/>
+          </p:cNvSpPr>
+          <p:nvPr>
+            <p:ph type="title"/>
+          </p:nvPr>
+        </p:nvSpPr>
+        <p:spPr/>
+        <p:txBody>
+          <a:bodyPr/>
+          <a:lstStyle/>
+          <a:p>
+            <a:r>
+              <a:rPr lang="en-US"/>
+              <a:t>Reversing </a:t>
+            </a:r>
+            <a:r>
+              <a:rPr lang="en-US" dirty="0"/>
+              <a:t>Changes</a:t>
+            </a:r>
+          </a:p>
+        </p:txBody>
+      </p:sp>
+      <p:sp>
+        <p:nvSpPr>
+          <p:cNvPr id="3" name="Content Placeholder 2">
+            <a:extLst>
+              <a:ext uri="{FF2B5EF4-FFF2-40B4-BE49-F238E27FC236}">
+                <a16:creationId xmlns:a16="http://schemas.microsoft.com/office/drawing/2014/main" id="{EAB65B02-2DCE-E9D8-75DF-CBF91DA98DFA}"/>
+              </a:ext>
+            </a:extLst>
+          </p:cNvPr>
+          <p:cNvSpPr>
+            <a:spLocks noGrp="1"/>
+          </p:cNvSpPr>
+          <p:nvPr>
+            <p:ph idx="1"/>
+          </p:nvPr>
+        </p:nvSpPr>
+        <p:spPr/>
+        <p:txBody>
+          <a:bodyPr/>
+          <a:lstStyle/>
+          <a:p>
+            <a:endParaRPr lang="en-US"/>
+          </a:p>
+        </p:txBody>
+      </p:sp>
+    </p:spTree>
+    <p:extLst>
+      <p:ext uri="{BB962C8B-B14F-4D97-AF65-F5344CB8AC3E}">
+        <p14:creationId xmlns:p14="http://schemas.microsoft.com/office/powerpoint/2010/main" val="2841099936"/>
       </p:ext>
     </p:extLst>
   </p:cSld>
@@ -5263,28 +6324,78 @@
           <a:p>
             <a:r>
               <a:rPr lang="en-US" dirty="0"/>
-              <a:t>Git commit –m &lt;</a:t>
-            </a:r>
-            <a:r>
-              <a:rPr lang="en-US" i="1" dirty="0"/>
+              <a:t>Git commit –m </a:t>
+            </a:r>
+            <a:r>
+              <a:rPr lang="en-US" dirty="0">
+                <a:solidFill>
+                  <a:schemeClr val="tx1">
+                    <a:lumMod val="50000"/>
+                    <a:lumOff val="50000"/>
+                  </a:schemeClr>
+                </a:solidFill>
+              </a:rPr>
+              <a:t>&lt;</a:t>
+            </a:r>
+            <a:r>
+              <a:rPr lang="en-US" i="1" dirty="0">
+                <a:solidFill>
+                  <a:schemeClr val="tx1">
+                    <a:lumMod val="50000"/>
+                    <a:lumOff val="50000"/>
+                  </a:schemeClr>
+                </a:solidFill>
+              </a:rPr>
               <a:t>commit-name</a:t>
             </a:r>
             <a:r>
+              <a:rPr lang="en-US" dirty="0">
+                <a:solidFill>
+                  <a:schemeClr val="tx1">
+                    <a:lumMod val="50000"/>
+                    <a:lumOff val="50000"/>
+                  </a:schemeClr>
+                </a:solidFill>
+              </a:rPr>
+              <a:t>&gt;</a:t>
+            </a:r>
+          </a:p>
+          <a:p>
+            <a:r>
               <a:rPr lang="en-US" dirty="0"/>
-              <a:t>&gt;</a:t>
-            </a:r>
-          </a:p>
-          <a:p>
-            <a:r>
-              <a:rPr lang="en-US" dirty="0"/>
-              <a:t>Git commit –am &lt;</a:t>
-            </a:r>
-            <a:r>
-              <a:rPr lang="en-US" i="1" dirty="0"/>
+              <a:t>Git commit –am </a:t>
+            </a:r>
+            <a:r>
+              <a:rPr lang="en-US" dirty="0">
+                <a:solidFill>
+                  <a:schemeClr val="tx1">
+                    <a:lumMod val="50000"/>
+                    <a:lumOff val="50000"/>
+                  </a:schemeClr>
+                </a:solidFill>
+              </a:rPr>
+              <a:t>&lt;</a:t>
+            </a:r>
+            <a:r>
+              <a:rPr lang="en-US" i="1" dirty="0">
+                <a:solidFill>
+                  <a:schemeClr val="tx1">
+                    <a:lumMod val="50000"/>
+                    <a:lumOff val="50000"/>
+                  </a:schemeClr>
+                </a:solidFill>
+              </a:rPr>
               <a:t>commit-name</a:t>
             </a:r>
             <a:r>
-              <a:rPr lang="en-US" dirty="0"/>
+              <a:rPr lang="en-US" dirty="0">
+                <a:solidFill>
+                  <a:schemeClr val="tx1">
+                    <a:lumMod val="50000"/>
+                    <a:lumOff val="50000"/>
+                  </a:schemeClr>
+                </a:solidFill>
+              </a:rPr>
               <a:t>&gt;</a:t>
             </a:r>
           </a:p>
@@ -5655,7 +6766,7 @@
           <a:p>
             <a:r>
               <a:rPr lang="en-US" dirty="0"/>
-              <a:t>Git checkout </a:t>
+              <a:t>git checkout </a:t>
             </a:r>
             <a:r>
               <a:rPr lang="en-US" dirty="0">
@@ -5694,7 +6805,7 @@
           <a:p>
             <a:r>
               <a:rPr lang="en-US" dirty="0"/>
-              <a:t>Git switch (</a:t>
+              <a:t>git switch (</a:t>
             </a:r>
             <a:r>
               <a:rPr lang="en-US" b="1" dirty="0">
@@ -5723,7 +6834,7 @@
                   </a:schemeClr>
                 </a:solidFill>
               </a:rPr>
-              <a:t>[&lt;</a:t>
+              <a:t>&lt;</a:t>
             </a:r>
             <a:r>
               <a:rPr lang="en-US" i="1" dirty="0">
@@ -5745,7 +6856,7 @@
                   </a:schemeClr>
                 </a:solidFill>
               </a:rPr>
-              <a:t>] </a:t>
+              <a:t> </a:t>
             </a:r>
             <a:r>
               <a:rPr lang="en-US" sz="2000" dirty="0">
@@ -6156,7 +7267,7 @@
           <a:p>
             <a:r>
               <a:rPr lang="en-US" dirty="0"/>
-              <a:t>Git merge </a:t>
+              <a:t>git merge </a:t>
             </a:r>
             <a:r>
               <a:rPr lang="en-US" dirty="0">

</xml_diff>